<commit_message>
Added support for schema-informed encodings, using the Office Open XML (Strict) schemas. Required linking to xml.xsd to support the http://www.w3.org/XML/1998/namespace, and xml.xsd is now included alongside the Open XML files. Converted all sample files to the newer Office 365 "Strict Open XML" format.
</commit_message>
<xml_diff>
--- a/samples/now.pptx
+++ b/samples/now.pptx
@@ -1,6 +1,6 @@
 
 <file path=ppt/presentation.xml><?xml version="1.0" encoding="utf-8"?>
-<p:presentation xmlns:a="http://schemas.openxmlformats.org/drawingml/2006/main" xmlns:r="http://schemas.openxmlformats.org/officeDocument/2006/relationships" xmlns:p="http://schemas.openxmlformats.org/presentationml/2006/main" saveSubsetFonts="1">
+<p:presentation xmlns:a="http://purl.oclc.org/ooxml/drawingml/main" xmlns:r="http://purl.oclc.org/ooxml/officeDocument/relationships" xmlns:p="http://purl.oclc.org/ooxml/presentationml/main" saveSubsetFonts="1" conformance="strict">
   <p:sldMasterIdLst>
     <p:sldMasterId id="2147483648" r:id="rId1"/>
   </p:sldMasterIdLst>
@@ -146,11 +146,27 @@
       </a:defRPr>
     </a:lvl9pPr>
   </p:defaultTextStyle>
+  <p:extLst>
+    <p:ext uri="{EFAFB233-063F-42B5-8137-9DF3F51BA10A}">
+      <p15:sldGuideLst xmlns:p15="http://schemas.microsoft.com/office/powerpoint/2012/main">
+        <p15:guide id="1" orient="horz" pos="2160">
+          <p15:clr>
+            <a:srgbClr val="A4A3A4"/>
+          </p15:clr>
+        </p15:guide>
+        <p15:guide id="2" pos="2880">
+          <p15:clr>
+            <a:srgbClr val="A4A3A4"/>
+          </p15:clr>
+        </p15:guide>
+      </p15:sldGuideLst>
+    </p:ext>
+  </p:extLst>
 </p:presentation>
 </file>
 
 <file path=ppt/notesMasters/notesMaster1.xml><?xml version="1.0" encoding="utf-8"?>
-<p:notesMaster xmlns:a="http://schemas.openxmlformats.org/drawingml/2006/main" xmlns:r="http://schemas.openxmlformats.org/officeDocument/2006/relationships" xmlns:p="http://schemas.openxmlformats.org/presentationml/2006/main">
+<p:notesMaster xmlns:a="http://purl.oclc.org/ooxml/drawingml/main" xmlns:r="http://purl.oclc.org/ooxml/officeDocument/relationships" xmlns:p="http://purl.oclc.org/ooxml/presentationml/main">
   <p:cSld>
     <p:bg>
       <p:bgRef idx="1001">
@@ -231,7 +247,7 @@
           <a:p>
             <a:fld id="{8FD37F92-F8EA-4B01-B085-A51F8E7C3FCE}" type="datetimeFigureOut">
               <a:rPr lang="en-US" smtClean="0"/>
-              <a:t>3/2/2014</a:t>
+              <a:t>2/18/15</a:t>
             </a:fld>
             <a:endParaRPr lang="en-US"/>
           </a:p>
@@ -500,7 +516,7 @@
 </file>
 
 <file path=ppt/notesSlides/notesSlide1.xml><?xml version="1.0" encoding="utf-8"?>
-<p:notes xmlns:a="http://schemas.openxmlformats.org/drawingml/2006/main" xmlns:r="http://schemas.openxmlformats.org/officeDocument/2006/relationships" xmlns:p="http://schemas.openxmlformats.org/presentationml/2006/main">
+<p:notes xmlns:a="http://purl.oclc.org/ooxml/drawingml/main" xmlns:r="http://purl.oclc.org/ooxml/officeDocument/relationships" xmlns:p="http://purl.oclc.org/ooxml/presentationml/main">
   <p:cSld>
     <p:spTree>
       <p:nvGrpSpPr>
@@ -590,7 +606,7 @@
 </file>
 
 <file path=ppt/notesSlides/notesSlide10.xml><?xml version="1.0" encoding="utf-8"?>
-<p:notes xmlns:a="http://schemas.openxmlformats.org/drawingml/2006/main" xmlns:r="http://schemas.openxmlformats.org/officeDocument/2006/relationships" xmlns:p="http://schemas.openxmlformats.org/presentationml/2006/main">
+<p:notes xmlns:a="http://purl.oclc.org/ooxml/drawingml/main" xmlns:r="http://purl.oclc.org/ooxml/officeDocument/relationships" xmlns:p="http://purl.oclc.org/ooxml/presentationml/main">
   <p:cSld>
     <p:spTree>
       <p:nvGrpSpPr>
@@ -637,7 +653,7 @@
           </a:p>
           <a:p>
             <a:r>
-              <a:rPr lang="en-US" baseline="0" dirty="0" smtClean="0"/>
+              <a:rPr lang="en-US" baseline="0%" dirty="0" smtClean="0"/>
               <a:t>For maximum impact, a</a:t>
             </a:r>
             <a:r>
@@ -645,7 +661,7 @@
               <a:t>lso need to look at how the</a:t>
             </a:r>
             <a:r>
-              <a:rPr lang="en-US" baseline="0" dirty="0" smtClean="0"/>
+              <a:rPr lang="en-US" baseline="0%" dirty="0" smtClean="0"/>
               <a:t> NOW operational concept</a:t>
             </a:r>
             <a:r>
@@ -653,7 +669,7 @@
               <a:t> changes the fleet’s logistics chain</a:t>
             </a:r>
             <a:r>
-              <a:rPr lang="en-US" baseline="0" dirty="0" smtClean="0"/>
+              <a:rPr lang="en-US" baseline="0%" dirty="0" smtClean="0"/>
               <a:t> and further influences acquisition criteria for new systems.  (See research slides for examples.)</a:t>
             </a:r>
           </a:p>
@@ -699,7 +715,7 @@
 </file>
 
 <file path=ppt/notesSlides/notesSlide11.xml><?xml version="1.0" encoding="utf-8"?>
-<p:notes xmlns:a="http://schemas.openxmlformats.org/drawingml/2006/main" xmlns:r="http://schemas.openxmlformats.org/officeDocument/2006/relationships" xmlns:p="http://schemas.openxmlformats.org/presentationml/2006/main">
+<p:notes xmlns:a="http://purl.oclc.org/ooxml/drawingml/main" xmlns:r="http://purl.oclc.org/ooxml/officeDocument/relationships" xmlns:p="http://purl.oclc.org/ooxml/presentationml/main">
   <p:cSld>
     <p:spTree>
       <p:nvGrpSpPr>
@@ -787,7 +803,7 @@
 </file>
 
 <file path=ppt/notesSlides/notesSlide12.xml><?xml version="1.0" encoding="utf-8"?>
-<p:notes xmlns:a="http://schemas.openxmlformats.org/drawingml/2006/main" xmlns:r="http://schemas.openxmlformats.org/officeDocument/2006/relationships" xmlns:p="http://schemas.openxmlformats.org/presentationml/2006/main">
+<p:notes xmlns:a="http://purl.oclc.org/ooxml/drawingml/main" xmlns:r="http://purl.oclc.org/ooxml/officeDocument/relationships" xmlns:p="http://purl.oclc.org/ooxml/presentationml/main">
   <p:cSld>
     <p:spTree>
       <p:nvGrpSpPr>
@@ -871,7 +887,7 @@
 </file>
 
 <file path=ppt/notesSlides/notesSlide13.xml><?xml version="1.0" encoding="utf-8"?>
-<p:notes xmlns:a="http://schemas.openxmlformats.org/drawingml/2006/main" xmlns:r="http://schemas.openxmlformats.org/officeDocument/2006/relationships" xmlns:p="http://schemas.openxmlformats.org/presentationml/2006/main">
+<p:notes xmlns:a="http://purl.oclc.org/ooxml/drawingml/main" xmlns:r="http://purl.oclc.org/ooxml/officeDocument/relationships" xmlns:p="http://purl.oclc.org/ooxml/presentationml/main">
   <p:cSld>
     <p:spTree>
       <p:nvGrpSpPr>
@@ -919,20 +935,16 @@
               <a:t>Selected for approval during 2014 OPNAV NPS Studies</a:t>
             </a:r>
             <a:r>
-              <a:rPr lang="en-US" baseline="0" dirty="0" smtClean="0"/>
-              <a:t> Program… but not on the funding list due to budget shortfalls</a:t>
-            </a:r>
-            <a:r>
-              <a:rPr lang="en-US" baseline="0" dirty="0" smtClean="0"/>
-              <a:t>.</a:t>
-            </a:r>
-          </a:p>
-          <a:p>
-            <a:endParaRPr lang="en-US" baseline="0" dirty="0" smtClean="0"/>
-          </a:p>
-          <a:p>
-            <a:r>
-              <a:rPr lang="en-US" baseline="0" dirty="0" smtClean="0"/>
+              <a:rPr lang="en-US" baseline="0%" dirty="0" smtClean="0"/>
+              <a:t> Program… but not on the funding list due to budget shortfalls.</a:t>
+            </a:r>
+          </a:p>
+          <a:p>
+            <a:endParaRPr lang="en-US" baseline="0%" dirty="0" smtClean="0"/>
+          </a:p>
+          <a:p>
+            <a:r>
+              <a:rPr lang="en-US" baseline="0%" dirty="0" smtClean="0"/>
               <a:t>RFC = Internet Engineering Task Force (IETF) Request for Comments (RFC), namely the peer-reviewed formal definition of a network protocol</a:t>
             </a:r>
             <a:endParaRPr lang="en-US" dirty="0"/>
@@ -976,7 +988,7 @@
 </file>
 
 <file path=ppt/notesSlides/notesSlide14.xml><?xml version="1.0" encoding="utf-8"?>
-<p:notes xmlns:a="http://schemas.openxmlformats.org/drawingml/2006/main" xmlns:r="http://schemas.openxmlformats.org/officeDocument/2006/relationships" xmlns:p="http://schemas.openxmlformats.org/presentationml/2006/main">
+<p:notes xmlns:a="http://purl.oclc.org/ooxml/drawingml/main" xmlns:r="http://purl.oclc.org/ooxml/officeDocument/relationships" xmlns:p="http://purl.oclc.org/ooxml/presentationml/main">
   <p:cSld>
     <p:spTree>
       <p:nvGrpSpPr>
@@ -1034,7 +1046,7 @@
               <a:t>) MMOWGLI game described</a:t>
             </a:r>
             <a:r>
-              <a:rPr lang="en-US" baseline="0" dirty="0" smtClean="0"/>
+              <a:rPr lang="en-US" baseline="0%" dirty="0" smtClean="0"/>
               <a:t> at </a:t>
             </a:r>
             <a:r>
@@ -1042,7 +1054,7 @@
               <a:t>https://portal.mmowgli.nps.edu/em2</a:t>
             </a:r>
             <a:r>
-              <a:rPr lang="en-US" baseline="0" dirty="0" smtClean="0"/>
+              <a:rPr lang="en-US" baseline="0%" dirty="0" smtClean="0"/>
               <a:t> </a:t>
             </a:r>
             <a:endParaRPr lang="en-US" dirty="0"/>
@@ -1086,7 +1098,7 @@
 </file>
 
 <file path=ppt/notesSlides/notesSlide15.xml><?xml version="1.0" encoding="utf-8"?>
-<p:notes xmlns:a="http://schemas.openxmlformats.org/drawingml/2006/main" xmlns:r="http://schemas.openxmlformats.org/officeDocument/2006/relationships" xmlns:p="http://schemas.openxmlformats.org/presentationml/2006/main">
+<p:notes xmlns:a="http://purl.oclc.org/ooxml/drawingml/main" xmlns:r="http://purl.oclc.org/ooxml/officeDocument/relationships" xmlns:p="http://purl.oclc.org/ooxml/presentationml/main">
   <p:cSld>
     <p:spTree>
       <p:nvGrpSpPr>
@@ -1134,20 +1146,16 @@
               <a:t>Tablet</a:t>
             </a:r>
             <a:r>
-              <a:rPr lang="en-US" baseline="0" dirty="0" smtClean="0"/>
-              <a:t> computers include high-quality camera, sufficient computation to stitch imagery together and compute a fix, accurate time, and motion sensors</a:t>
-            </a:r>
-            <a:r>
-              <a:rPr lang="en-US" baseline="0" dirty="0" smtClean="0"/>
-              <a:t>.</a:t>
-            </a:r>
-          </a:p>
-          <a:p>
-            <a:endParaRPr lang="en-US" baseline="0" dirty="0" smtClean="0"/>
-          </a:p>
-          <a:p>
-            <a:r>
-              <a:rPr lang="en-US" baseline="0" dirty="0" smtClean="0"/>
+              <a:rPr lang="en-US" baseline="0%" dirty="0" smtClean="0"/>
+              <a:t> computers include high-quality camera, sufficient computation to stitch imagery together and compute a fix, accurate time, and motion sensors.</a:t>
+            </a:r>
+          </a:p>
+          <a:p>
+            <a:endParaRPr lang="en-US" baseline="0%" dirty="0" smtClean="0"/>
+          </a:p>
+          <a:p>
+            <a:r>
+              <a:rPr lang="en-US" baseline="0%" dirty="0" smtClean="0"/>
               <a:t>TBD = to be determined</a:t>
             </a:r>
             <a:endParaRPr lang="en-US" dirty="0"/>
@@ -1191,7 +1199,7 @@
 </file>
 
 <file path=ppt/notesSlides/notesSlide16.xml><?xml version="1.0" encoding="utf-8"?>
-<p:notes xmlns:a="http://schemas.openxmlformats.org/drawingml/2006/main" xmlns:r="http://schemas.openxmlformats.org/officeDocument/2006/relationships" xmlns:p="http://schemas.openxmlformats.org/presentationml/2006/main">
+<p:notes xmlns:a="http://purl.oclc.org/ooxml/drawingml/main" xmlns:r="http://purl.oclc.org/ooxml/officeDocument/relationships" xmlns:p="http://purl.oclc.org/ooxml/presentationml/main">
   <p:cSld>
     <p:spTree>
       <p:nvGrpSpPr>
@@ -1279,7 +1287,7 @@
 </file>
 
 <file path=ppt/notesSlides/notesSlide17.xml><?xml version="1.0" encoding="utf-8"?>
-<p:notes xmlns:a="http://schemas.openxmlformats.org/drawingml/2006/main" xmlns:r="http://schemas.openxmlformats.org/officeDocument/2006/relationships" xmlns:p="http://schemas.openxmlformats.org/presentationml/2006/main">
+<p:notes xmlns:a="http://purl.oclc.org/ooxml/drawingml/main" xmlns:r="http://purl.oclc.org/ooxml/officeDocument/relationships" xmlns:p="http://purl.oclc.org/ooxml/presentationml/main">
   <p:cSld>
     <p:spTree>
       <p:nvGrpSpPr>
@@ -1367,7 +1375,7 @@
 </file>
 
 <file path=ppt/notesSlides/notesSlide18.xml><?xml version="1.0" encoding="utf-8"?>
-<p:notes xmlns:a="http://schemas.openxmlformats.org/drawingml/2006/main" xmlns:r="http://schemas.openxmlformats.org/officeDocument/2006/relationships" xmlns:p="http://schemas.openxmlformats.org/presentationml/2006/main">
+<p:notes xmlns:a="http://purl.oclc.org/ooxml/drawingml/main" xmlns:r="http://purl.oclc.org/ooxml/officeDocument/relationships" xmlns:p="http://purl.oclc.org/ooxml/presentationml/main">
   <p:cSld>
     <p:spTree>
       <p:nvGrpSpPr>
@@ -1452,6 +1460,11 @@
         </p:txBody>
       </p:sp>
     </p:spTree>
+    <p:extLst>
+      <p:ext uri="{BB962C8B-B14F-4D97-AF65-F5344CB8AC3E}">
+        <p14:creationId xmlns:p14="http://schemas.microsoft.com/office/powerpoint/2010/main" val="874632487"/>
+      </p:ext>
+    </p:extLst>
   </p:cSld>
   <p:clrMapOvr>
     <a:masterClrMapping/>
@@ -1460,7 +1473,7 @@
 </file>
 
 <file path=ppt/notesSlides/notesSlide2.xml><?xml version="1.0" encoding="utf-8"?>
-<p:notes xmlns:a="http://schemas.openxmlformats.org/drawingml/2006/main" xmlns:r="http://schemas.openxmlformats.org/officeDocument/2006/relationships" xmlns:p="http://schemas.openxmlformats.org/presentationml/2006/main">
+<p:notes xmlns:a="http://purl.oclc.org/ooxml/drawingml/main" xmlns:r="http://purl.oclc.org/ooxml/officeDocument/relationships" xmlns:p="http://purl.oclc.org/ooxml/presentationml/main">
   <p:cSld>
     <p:spTree>
       <p:nvGrpSpPr>
@@ -1508,15 +1521,15 @@
               <a:t>Navy ships and aircraft are vulnerable</a:t>
             </a:r>
             <a:r>
-              <a:rPr lang="en-US" baseline="0" dirty="0" smtClean="0"/>
+              <a:rPr lang="en-US" baseline="0%" dirty="0" smtClean="0"/>
               <a:t> to detection, tracking and targeting because they are constantly emitting </a:t>
             </a:r>
             <a:r>
-              <a:rPr lang="en-US" baseline="0" smtClean="0"/>
+              <a:rPr lang="en-US" baseline="0%" smtClean="0"/>
               <a:t>detectable EM energy</a:t>
             </a:r>
             <a:r>
-              <a:rPr lang="en-US" baseline="0" dirty="0" smtClean="0"/>
+              <a:rPr lang="en-US" baseline="0%" dirty="0" smtClean="0"/>
               <a:t>.</a:t>
             </a:r>
             <a:endParaRPr lang="en-US" dirty="0"/>
@@ -1560,7 +1573,7 @@
 </file>
 
 <file path=ppt/notesSlides/notesSlide3.xml><?xml version="1.0" encoding="utf-8"?>
-<p:notes xmlns:a="http://schemas.openxmlformats.org/drawingml/2006/main" xmlns:r="http://schemas.openxmlformats.org/officeDocument/2006/relationships" xmlns:p="http://schemas.openxmlformats.org/presentationml/2006/main">
+<p:notes xmlns:a="http://purl.oclc.org/ooxml/drawingml/main" xmlns:r="http://purl.oclc.org/ooxml/officeDocument/relationships" xmlns:p="http://purl.oclc.org/ooxml/presentationml/main">
   <p:cSld>
     <p:spTree>
       <p:nvGrpSpPr>
@@ -1791,7 +1804,7 @@
 </file>
 
 <file path=ppt/notesSlides/notesSlide4.xml><?xml version="1.0" encoding="utf-8"?>
-<p:notes xmlns:a="http://schemas.openxmlformats.org/drawingml/2006/main" xmlns:r="http://schemas.openxmlformats.org/officeDocument/2006/relationships" xmlns:p="http://schemas.openxmlformats.org/presentationml/2006/main">
+<p:notes xmlns:a="http://purl.oclc.org/ooxml/drawingml/main" xmlns:r="http://purl.oclc.org/ooxml/officeDocument/relationships" xmlns:p="http://purl.oclc.org/ooxml/presentationml/main">
   <p:cSld>
     <p:spTree>
       <p:nvGrpSpPr>
@@ -1879,7 +1892,7 @@
 </file>
 
 <file path=ppt/notesSlides/notesSlide5.xml><?xml version="1.0" encoding="utf-8"?>
-<p:notes xmlns:a="http://schemas.openxmlformats.org/drawingml/2006/main" xmlns:r="http://schemas.openxmlformats.org/officeDocument/2006/relationships" xmlns:p="http://schemas.openxmlformats.org/presentationml/2006/main">
+<p:notes xmlns:a="http://purl.oclc.org/ooxml/drawingml/main" xmlns:r="http://purl.oclc.org/ooxml/officeDocument/relationships" xmlns:p="http://purl.oclc.org/ooxml/presentationml/main">
   <p:cSld>
     <p:spTree>
       <p:nvGrpSpPr>
@@ -1927,14 +1940,13 @@
               <a:t>Careful choice of words: gradate.</a:t>
             </a:r>
             <a:r>
-              <a:rPr lang="en-US" baseline="0" dirty="0" smtClean="0"/>
+              <a:rPr lang="en-US" baseline="0%" dirty="0" smtClean="0"/>
               <a:t>  </a:t>
             </a:r>
             <a:r>
               <a:rPr lang="en-US" dirty="0" smtClean="0"/>
               <a:t>http://en.wiktionary.org/wiki/gradate#English </a:t>
             </a:r>
-            <a:endParaRPr lang="en-US" dirty="0" smtClean="0"/>
           </a:p>
           <a:p>
             <a:endParaRPr lang="en-US" dirty="0" smtClean="0"/>
@@ -1985,7 +1997,7 @@
 </file>
 
 <file path=ppt/notesSlides/notesSlide6.xml><?xml version="1.0" encoding="utf-8"?>
-<p:notes xmlns:a="http://schemas.openxmlformats.org/drawingml/2006/main" xmlns:r="http://schemas.openxmlformats.org/officeDocument/2006/relationships" xmlns:p="http://schemas.openxmlformats.org/presentationml/2006/main">
+<p:notes xmlns:a="http://purl.oclc.org/ooxml/drawingml/main" xmlns:r="http://purl.oclc.org/ooxml/officeDocument/relationships" xmlns:p="http://purl.oclc.org/ooxml/presentationml/main">
   <p:cSld>
     <p:spTree>
       <p:nvGrpSpPr>
@@ -2069,7 +2081,7 @@
 </file>
 
 <file path=ppt/notesSlides/notesSlide7.xml><?xml version="1.0" encoding="utf-8"?>
-<p:notes xmlns:a="http://schemas.openxmlformats.org/drawingml/2006/main" xmlns:r="http://schemas.openxmlformats.org/officeDocument/2006/relationships" xmlns:p="http://schemas.openxmlformats.org/presentationml/2006/main">
+<p:notes xmlns:a="http://purl.oclc.org/ooxml/drawingml/main" xmlns:r="http://purl.oclc.org/ooxml/officeDocument/relationships" xmlns:p="http://purl.oclc.org/ooxml/presentationml/main">
   <p:cSld>
     <p:spTree>
       <p:nvGrpSpPr>
@@ -2127,57 +2139,57 @@
               <a:t>NCW</a:t>
             </a:r>
             <a:r>
-              <a:rPr lang="en-US" baseline="0" dirty="0" smtClean="0"/>
+              <a:rPr lang="en-US" baseline="0%" dirty="0" smtClean="0"/>
               <a:t> = Network Centric Warfare, being pursued because blue water Carrier Battle Groups, Expeditionary Strike Groups, and Surface Action Groups depend on constant radiation</a:t>
             </a:r>
           </a:p>
           <a:p>
             <a:r>
-              <a:rPr lang="en-US" baseline="0" dirty="0" smtClean="0"/>
+              <a:rPr lang="en-US" baseline="0%" dirty="0" smtClean="0"/>
               <a:t>EMCON = Emission Control, much discussed but rarely practiced.</a:t>
             </a:r>
           </a:p>
           <a:p>
             <a:r>
-              <a:rPr lang="en-US" baseline="0" dirty="0" smtClean="0"/>
+              <a:rPr lang="en-US" baseline="0%" dirty="0" smtClean="0"/>
               <a:t>NOW = Network Optional Warfare—using many means to stay silent and achieve surprise attacks, historically natural for submarines and practiced by coastal flotillas.</a:t>
             </a:r>
           </a:p>
           <a:p>
             <a:r>
-              <a:rPr lang="en-US" baseline="0" dirty="0" smtClean="0"/>
+              <a:rPr lang="en-US" baseline="0%" dirty="0" smtClean="0"/>
               <a:t>LOS = Line of sight connectivity.</a:t>
             </a:r>
           </a:p>
           <a:p>
             <a:r>
-              <a:rPr lang="en-US" baseline="0" dirty="0" smtClean="0"/>
+              <a:rPr lang="en-US" baseline="0%" dirty="0" smtClean="0"/>
               <a:t>LPI = Low probability of intercept technology.</a:t>
             </a:r>
           </a:p>
           <a:p>
             <a:r>
-              <a:rPr lang="en-US" baseline="0" dirty="0" smtClean="0"/>
+              <a:rPr lang="en-US" baseline="0%" dirty="0" smtClean="0"/>
               <a:t>ROO = Rules of operations: can be different for the flotilla and ASW, MCM, NGFS, and logistics ships.</a:t>
             </a:r>
           </a:p>
           <a:p>
             <a:r>
-              <a:rPr lang="en-US" baseline="0" dirty="0" smtClean="0"/>
+              <a:rPr lang="en-US" baseline="0%" dirty="0" smtClean="0"/>
               <a:t>ROE = Rules of engagement: there will be a sharp distinction between the tight, risky rules for peacetime confrontation and almost unconstrained ops locally, once conflict has started.</a:t>
             </a:r>
           </a:p>
           <a:p>
             <a:r>
-              <a:rPr lang="en-US" baseline="0" dirty="0" smtClean="0"/>
+              <a:rPr lang="en-US" baseline="0%" dirty="0" smtClean="0"/>
               <a:t>SOP = Standard operating procedures: tactics, techniques, </a:t>
             </a:r>
             <a:r>
-              <a:rPr lang="en-US" baseline="0" dirty="0" err="1" smtClean="0"/>
+              <a:rPr lang="en-US" baseline="0%" dirty="0" err="1" smtClean="0"/>
               <a:t>doctines</a:t>
             </a:r>
             <a:r>
-              <a:rPr lang="en-US" baseline="0" dirty="0" smtClean="0"/>
+              <a:rPr lang="en-US" baseline="0%" dirty="0" smtClean="0"/>
               <a:t>, and C2.</a:t>
             </a:r>
             <a:endParaRPr lang="en-US" dirty="0"/>
@@ -2221,7 +2233,7 @@
 </file>
 
 <file path=ppt/notesSlides/notesSlide8.xml><?xml version="1.0" encoding="utf-8"?>
-<p:notes xmlns:a="http://schemas.openxmlformats.org/drawingml/2006/main" xmlns:r="http://schemas.openxmlformats.org/officeDocument/2006/relationships" xmlns:p="http://schemas.openxmlformats.org/presentationml/2006/main">
+<p:notes xmlns:a="http://purl.oclc.org/ooxml/drawingml/main" xmlns:r="http://purl.oclc.org/ooxml/officeDocument/relationships" xmlns:p="http://purl.oclc.org/ooxml/presentationml/main">
   <p:cSld>
     <p:spTree>
       <p:nvGrpSpPr>
@@ -2274,7 +2286,7 @@
           </a:p>
           <a:p>
             <a:r>
-              <a:rPr lang="en-US" baseline="0" dirty="0" smtClean="0"/>
+              <a:rPr lang="en-US" baseline="0%" dirty="0" smtClean="0"/>
               <a:t>For maximum impact, a</a:t>
             </a:r>
             <a:r>
@@ -2282,7 +2294,7 @@
               <a:t>lso need to look at how this changes the fleet’s logistics chain</a:t>
             </a:r>
             <a:r>
-              <a:rPr lang="en-US" baseline="0" dirty="0" smtClean="0"/>
+              <a:rPr lang="en-US" baseline="0%" dirty="0" smtClean="0"/>
               <a:t> and further influences acquisition criteria for new systems.</a:t>
             </a:r>
           </a:p>
@@ -2331,7 +2343,7 @@
 </file>
 
 <file path=ppt/notesSlides/notesSlide9.xml><?xml version="1.0" encoding="utf-8"?>
-<p:notes xmlns:a="http://schemas.openxmlformats.org/drawingml/2006/main" xmlns:r="http://schemas.openxmlformats.org/officeDocument/2006/relationships" xmlns:p="http://schemas.openxmlformats.org/presentationml/2006/main">
+<p:notes xmlns:a="http://purl.oclc.org/ooxml/drawingml/main" xmlns:r="http://purl.oclc.org/ooxml/officeDocument/relationships" xmlns:p="http://purl.oclc.org/ooxml/presentationml/main">
   <p:cSld>
     <p:spTree>
       <p:nvGrpSpPr>
@@ -2376,7 +2388,7 @@
           <a:p>
             <a:pPr marL="0" marR="0" indent="0" algn="l" defTabSz="914400" rtl="0" eaLnBrk="1" fontAlgn="auto" latinLnBrk="0" hangingPunct="1">
               <a:lnSpc>
-                <a:spcPct val="100000"/>
+                <a:spcPct val="100%"/>
               </a:lnSpc>
               <a:spcBef>
                 <a:spcPts val="0"/>
@@ -2396,7 +2408,7 @@
               <a:t>This might evolve into an information dominance strategy, not</a:t>
             </a:r>
             <a:r>
-              <a:rPr lang="en-US" baseline="0" dirty="0" smtClean="0"/>
+              <a:rPr lang="en-US" baseline="0%" dirty="0" smtClean="0"/>
               <a:t> just an operational concept.</a:t>
             </a:r>
             <a:endParaRPr lang="en-US" dirty="0" smtClean="0"/>
@@ -2443,7 +2455,7 @@
 </file>
 
 <file path=ppt/slideLayouts/slideLayout1.xml><?xml version="1.0" encoding="utf-8"?>
-<p:sldLayout xmlns:a="http://schemas.openxmlformats.org/drawingml/2006/main" xmlns:r="http://schemas.openxmlformats.org/officeDocument/2006/relationships" xmlns:p="http://schemas.openxmlformats.org/presentationml/2006/main" type="title" preserve="1">
+<p:sldLayout xmlns:a="http://purl.oclc.org/ooxml/drawingml/main" xmlns:r="http://purl.oclc.org/ooxml/officeDocument/relationships" xmlns:p="http://purl.oclc.org/ooxml/presentationml/main" type="title" preserve="1">
   <p:cSld name="Title Slide">
     <p:spTree>
       <p:nvGrpSpPr>
@@ -2511,7 +2523,7 @@
               <a:defRPr>
                 <a:solidFill>
                   <a:schemeClr val="tx1">
-                    <a:tint val="75000"/>
+                    <a:tint val="75%"/>
                   </a:schemeClr>
                 </a:solidFill>
               </a:defRPr>
@@ -2521,7 +2533,7 @@
               <a:defRPr>
                 <a:solidFill>
                   <a:schemeClr val="tx1">
-                    <a:tint val="75000"/>
+                    <a:tint val="75%"/>
                   </a:schemeClr>
                 </a:solidFill>
               </a:defRPr>
@@ -2531,7 +2543,7 @@
               <a:defRPr>
                 <a:solidFill>
                   <a:schemeClr val="tx1">
-                    <a:tint val="75000"/>
+                    <a:tint val="75%"/>
                   </a:schemeClr>
                 </a:solidFill>
               </a:defRPr>
@@ -2541,7 +2553,7 @@
               <a:defRPr>
                 <a:solidFill>
                   <a:schemeClr val="tx1">
-                    <a:tint val="75000"/>
+                    <a:tint val="75%"/>
                   </a:schemeClr>
                 </a:solidFill>
               </a:defRPr>
@@ -2551,7 +2563,7 @@
               <a:defRPr>
                 <a:solidFill>
                   <a:schemeClr val="tx1">
-                    <a:tint val="75000"/>
+                    <a:tint val="75%"/>
                   </a:schemeClr>
                 </a:solidFill>
               </a:defRPr>
@@ -2561,7 +2573,7 @@
               <a:defRPr>
                 <a:solidFill>
                   <a:schemeClr val="tx1">
-                    <a:tint val="75000"/>
+                    <a:tint val="75%"/>
                   </a:schemeClr>
                 </a:solidFill>
               </a:defRPr>
@@ -2571,7 +2583,7 @@
               <a:defRPr>
                 <a:solidFill>
                   <a:schemeClr val="tx1">
-                    <a:tint val="75000"/>
+                    <a:tint val="75%"/>
                   </a:schemeClr>
                 </a:solidFill>
               </a:defRPr>
@@ -2581,7 +2593,7 @@
               <a:defRPr>
                 <a:solidFill>
                   <a:schemeClr val="tx1">
-                    <a:tint val="75000"/>
+                    <a:tint val="75%"/>
                   </a:schemeClr>
                 </a:solidFill>
               </a:defRPr>
@@ -2591,7 +2603,7 @@
               <a:defRPr>
                 <a:solidFill>
                   <a:schemeClr val="tx1">
-                    <a:tint val="75000"/>
+                    <a:tint val="75%"/>
                   </a:schemeClr>
                 </a:solidFill>
               </a:defRPr>
@@ -2623,7 +2635,7 @@
           <a:p>
             <a:fld id="{1CF16B7D-0063-428A-B5D3-BA448AD9F444}" type="datetimeFigureOut">
               <a:rPr lang="en-US" smtClean="0"/>
-              <a:t>3/2/2014</a:t>
+              <a:t>2/18/15</a:t>
             </a:fld>
             <a:endParaRPr lang="en-US"/>
           </a:p>
@@ -2685,7 +2697,7 @@
 </file>
 
 <file path=ppt/slideLayouts/slideLayout10.xml><?xml version="1.0" encoding="utf-8"?>
-<p:sldLayout xmlns:a="http://schemas.openxmlformats.org/drawingml/2006/main" xmlns:r="http://schemas.openxmlformats.org/officeDocument/2006/relationships" xmlns:p="http://schemas.openxmlformats.org/presentationml/2006/main" type="vertTx" preserve="1">
+<p:sldLayout xmlns:a="http://purl.oclc.org/ooxml/drawingml/main" xmlns:r="http://purl.oclc.org/ooxml/officeDocument/relationships" xmlns:p="http://purl.oclc.org/ooxml/presentationml/main" type="vertTx" preserve="1">
   <p:cSld name="Title and Vertical Text">
     <p:spTree>
       <p:nvGrpSpPr>
@@ -2793,7 +2805,7 @@
           <a:p>
             <a:fld id="{1CF16B7D-0063-428A-B5D3-BA448AD9F444}" type="datetimeFigureOut">
               <a:rPr lang="en-US" smtClean="0"/>
-              <a:t>3/2/2014</a:t>
+              <a:t>2/18/15</a:t>
             </a:fld>
             <a:endParaRPr lang="en-US"/>
           </a:p>
@@ -2855,7 +2867,7 @@
 </file>
 
 <file path=ppt/slideLayouts/slideLayout11.xml><?xml version="1.0" encoding="utf-8"?>
-<p:sldLayout xmlns:a="http://schemas.openxmlformats.org/drawingml/2006/main" xmlns:r="http://schemas.openxmlformats.org/officeDocument/2006/relationships" xmlns:p="http://schemas.openxmlformats.org/presentationml/2006/main" type="vertTitleAndTx" preserve="1">
+<p:sldLayout xmlns:a="http://purl.oclc.org/ooxml/drawingml/main" xmlns:r="http://purl.oclc.org/ooxml/officeDocument/relationships" xmlns:p="http://purl.oclc.org/ooxml/presentationml/main" type="vertTitleAndTx" preserve="1">
   <p:cSld name="Vertical Title and Text">
     <p:spTree>
       <p:nvGrpSpPr>
@@ -2973,7 +2985,7 @@
           <a:p>
             <a:fld id="{1CF16B7D-0063-428A-B5D3-BA448AD9F444}" type="datetimeFigureOut">
               <a:rPr lang="en-US" smtClean="0"/>
-              <a:t>3/2/2014</a:t>
+              <a:t>2/18/15</a:t>
             </a:fld>
             <a:endParaRPr lang="en-US"/>
           </a:p>
@@ -3035,7 +3047,7 @@
 </file>
 
 <file path=ppt/slideLayouts/slideLayout2.xml><?xml version="1.0" encoding="utf-8"?>
-<p:sldLayout xmlns:a="http://schemas.openxmlformats.org/drawingml/2006/main" xmlns:r="http://schemas.openxmlformats.org/officeDocument/2006/relationships" xmlns:p="http://schemas.openxmlformats.org/presentationml/2006/main" type="obj" preserve="1">
+<p:sldLayout xmlns:a="http://purl.oclc.org/ooxml/drawingml/main" xmlns:r="http://purl.oclc.org/ooxml/officeDocument/relationships" xmlns:p="http://purl.oclc.org/ooxml/presentationml/main" type="obj" preserve="1">
   <p:cSld name="Title and Content">
     <p:spTree>
       <p:nvGrpSpPr>
@@ -3143,7 +3155,7 @@
           <a:p>
             <a:fld id="{1CF16B7D-0063-428A-B5D3-BA448AD9F444}" type="datetimeFigureOut">
               <a:rPr lang="en-US" smtClean="0"/>
-              <a:t>3/2/2014</a:t>
+              <a:t>2/18/15</a:t>
             </a:fld>
             <a:endParaRPr lang="en-US"/>
           </a:p>
@@ -3205,7 +3217,7 @@
 </file>
 
 <file path=ppt/slideLayouts/slideLayout3.xml><?xml version="1.0" encoding="utf-8"?>
-<p:sldLayout xmlns:a="http://schemas.openxmlformats.org/drawingml/2006/main" xmlns:r="http://schemas.openxmlformats.org/officeDocument/2006/relationships" xmlns:p="http://schemas.openxmlformats.org/presentationml/2006/main" type="secHead" preserve="1">
+<p:sldLayout xmlns:a="http://purl.oclc.org/ooxml/drawingml/main" xmlns:r="http://purl.oclc.org/ooxml/officeDocument/relationships" xmlns:p="http://purl.oclc.org/ooxml/presentationml/main" type="secHead" preserve="1">
   <p:cSld name="Section Header">
     <p:spTree>
       <p:nvGrpSpPr>
@@ -3277,7 +3289,7 @@
               <a:defRPr sz="2000">
                 <a:solidFill>
                   <a:schemeClr val="tx1">
-                    <a:tint val="75000"/>
+                    <a:tint val="75%"/>
                   </a:schemeClr>
                 </a:solidFill>
               </a:defRPr>
@@ -3287,7 +3299,7 @@
               <a:defRPr sz="1800">
                 <a:solidFill>
                   <a:schemeClr val="tx1">
-                    <a:tint val="75000"/>
+                    <a:tint val="75%"/>
                   </a:schemeClr>
                 </a:solidFill>
               </a:defRPr>
@@ -3297,7 +3309,7 @@
               <a:defRPr sz="1600">
                 <a:solidFill>
                   <a:schemeClr val="tx1">
-                    <a:tint val="75000"/>
+                    <a:tint val="75%"/>
                   </a:schemeClr>
                 </a:solidFill>
               </a:defRPr>
@@ -3307,7 +3319,7 @@
               <a:defRPr sz="1400">
                 <a:solidFill>
                   <a:schemeClr val="tx1">
-                    <a:tint val="75000"/>
+                    <a:tint val="75%"/>
                   </a:schemeClr>
                 </a:solidFill>
               </a:defRPr>
@@ -3317,7 +3329,7 @@
               <a:defRPr sz="1400">
                 <a:solidFill>
                   <a:schemeClr val="tx1">
-                    <a:tint val="75000"/>
+                    <a:tint val="75%"/>
                   </a:schemeClr>
                 </a:solidFill>
               </a:defRPr>
@@ -3327,7 +3339,7 @@
               <a:defRPr sz="1400">
                 <a:solidFill>
                   <a:schemeClr val="tx1">
-                    <a:tint val="75000"/>
+                    <a:tint val="75%"/>
                   </a:schemeClr>
                 </a:solidFill>
               </a:defRPr>
@@ -3337,7 +3349,7 @@
               <a:defRPr sz="1400">
                 <a:solidFill>
                   <a:schemeClr val="tx1">
-                    <a:tint val="75000"/>
+                    <a:tint val="75%"/>
                   </a:schemeClr>
                 </a:solidFill>
               </a:defRPr>
@@ -3347,7 +3359,7 @@
               <a:defRPr sz="1400">
                 <a:solidFill>
                   <a:schemeClr val="tx1">
-                    <a:tint val="75000"/>
+                    <a:tint val="75%"/>
                   </a:schemeClr>
                 </a:solidFill>
               </a:defRPr>
@@ -3357,7 +3369,7 @@
               <a:defRPr sz="1400">
                 <a:solidFill>
                   <a:schemeClr val="tx1">
-                    <a:tint val="75000"/>
+                    <a:tint val="75%"/>
                   </a:schemeClr>
                 </a:solidFill>
               </a:defRPr>
@@ -3389,7 +3401,7 @@
           <a:p>
             <a:fld id="{1CF16B7D-0063-428A-B5D3-BA448AD9F444}" type="datetimeFigureOut">
               <a:rPr lang="en-US" smtClean="0"/>
-              <a:t>3/2/2014</a:t>
+              <a:t>2/18/15</a:t>
             </a:fld>
             <a:endParaRPr lang="en-US"/>
           </a:p>
@@ -3451,7 +3463,7 @@
 </file>
 
 <file path=ppt/slideLayouts/slideLayout4.xml><?xml version="1.0" encoding="utf-8"?>
-<p:sldLayout xmlns:a="http://schemas.openxmlformats.org/drawingml/2006/main" xmlns:r="http://schemas.openxmlformats.org/officeDocument/2006/relationships" xmlns:p="http://schemas.openxmlformats.org/presentationml/2006/main" type="twoObj" preserve="1">
+<p:sldLayout xmlns:a="http://purl.oclc.org/ooxml/drawingml/main" xmlns:r="http://purl.oclc.org/ooxml/officeDocument/relationships" xmlns:p="http://purl.oclc.org/ooxml/presentationml/main" type="twoObj" preserve="1">
   <p:cSld name="Two Content">
     <p:spTree>
       <p:nvGrpSpPr>
@@ -3677,7 +3689,7 @@
           <a:p>
             <a:fld id="{1CF16B7D-0063-428A-B5D3-BA448AD9F444}" type="datetimeFigureOut">
               <a:rPr lang="en-US" smtClean="0"/>
-              <a:t>3/2/2014</a:t>
+              <a:t>2/18/15</a:t>
             </a:fld>
             <a:endParaRPr lang="en-US"/>
           </a:p>
@@ -3739,7 +3751,7 @@
 </file>
 
 <file path=ppt/slideLayouts/slideLayout5.xml><?xml version="1.0" encoding="utf-8"?>
-<p:sldLayout xmlns:a="http://schemas.openxmlformats.org/drawingml/2006/main" xmlns:r="http://schemas.openxmlformats.org/officeDocument/2006/relationships" xmlns:p="http://schemas.openxmlformats.org/presentationml/2006/main" type="twoTxTwoObj" preserve="1">
+<p:sldLayout xmlns:a="http://purl.oclc.org/ooxml/drawingml/main" xmlns:r="http://purl.oclc.org/ooxml/officeDocument/relationships" xmlns:p="http://purl.oclc.org/ooxml/presentationml/main" type="twoTxTwoObj" preserve="1">
   <p:cSld name="Comparison">
     <p:spTree>
       <p:nvGrpSpPr>
@@ -4099,7 +4111,7 @@
           <a:p>
             <a:fld id="{1CF16B7D-0063-428A-B5D3-BA448AD9F444}" type="datetimeFigureOut">
               <a:rPr lang="en-US" smtClean="0"/>
-              <a:t>3/2/2014</a:t>
+              <a:t>2/18/15</a:t>
             </a:fld>
             <a:endParaRPr lang="en-US"/>
           </a:p>
@@ -4161,7 +4173,7 @@
 </file>
 
 <file path=ppt/slideLayouts/slideLayout6.xml><?xml version="1.0" encoding="utf-8"?>
-<p:sldLayout xmlns:a="http://schemas.openxmlformats.org/drawingml/2006/main" xmlns:r="http://schemas.openxmlformats.org/officeDocument/2006/relationships" xmlns:p="http://schemas.openxmlformats.org/presentationml/2006/main" type="titleOnly" preserve="1">
+<p:sldLayout xmlns:a="http://purl.oclc.org/ooxml/drawingml/main" xmlns:r="http://purl.oclc.org/ooxml/officeDocument/relationships" xmlns:p="http://purl.oclc.org/ooxml/presentationml/main" type="titleOnly" preserve="1">
   <p:cSld name="Title Only">
     <p:spTree>
       <p:nvGrpSpPr>
@@ -4217,7 +4229,7 @@
           <a:p>
             <a:fld id="{1CF16B7D-0063-428A-B5D3-BA448AD9F444}" type="datetimeFigureOut">
               <a:rPr lang="en-US" smtClean="0"/>
-              <a:t>3/2/2014</a:t>
+              <a:t>2/18/15</a:t>
             </a:fld>
             <a:endParaRPr lang="en-US"/>
           </a:p>
@@ -4279,7 +4291,7 @@
 </file>
 
 <file path=ppt/slideLayouts/slideLayout7.xml><?xml version="1.0" encoding="utf-8"?>
-<p:sldLayout xmlns:a="http://schemas.openxmlformats.org/drawingml/2006/main" xmlns:r="http://schemas.openxmlformats.org/officeDocument/2006/relationships" xmlns:p="http://schemas.openxmlformats.org/presentationml/2006/main" type="blank" preserve="1">
+<p:sldLayout xmlns:a="http://purl.oclc.org/ooxml/drawingml/main" xmlns:r="http://purl.oclc.org/ooxml/officeDocument/relationships" xmlns:p="http://purl.oclc.org/ooxml/presentationml/main" type="blank" preserve="1">
   <p:cSld name="Blank">
     <p:spTree>
       <p:nvGrpSpPr>
@@ -4312,7 +4324,7 @@
           <a:p>
             <a:fld id="{1CF16B7D-0063-428A-B5D3-BA448AD9F444}" type="datetimeFigureOut">
               <a:rPr lang="en-US" smtClean="0"/>
-              <a:t>3/2/2014</a:t>
+              <a:t>2/18/15</a:t>
             </a:fld>
             <a:endParaRPr lang="en-US"/>
           </a:p>
@@ -4374,7 +4386,7 @@
 </file>
 
 <file path=ppt/slideLayouts/slideLayout8.xml><?xml version="1.0" encoding="utf-8"?>
-<p:sldLayout xmlns:a="http://schemas.openxmlformats.org/drawingml/2006/main" xmlns:r="http://schemas.openxmlformats.org/officeDocument/2006/relationships" xmlns:p="http://schemas.openxmlformats.org/presentationml/2006/main" type="objTx" preserve="1">
+<p:sldLayout xmlns:a="http://purl.oclc.org/ooxml/drawingml/main" xmlns:r="http://purl.oclc.org/ooxml/officeDocument/relationships" xmlns:p="http://purl.oclc.org/ooxml/presentationml/main" type="objTx" preserve="1">
   <p:cSld name="Content with Caption">
     <p:spTree>
       <p:nvGrpSpPr>
@@ -4589,7 +4601,7 @@
           <a:p>
             <a:fld id="{1CF16B7D-0063-428A-B5D3-BA448AD9F444}" type="datetimeFigureOut">
               <a:rPr lang="en-US" smtClean="0"/>
-              <a:t>3/2/2014</a:t>
+              <a:t>2/18/15</a:t>
             </a:fld>
             <a:endParaRPr lang="en-US"/>
           </a:p>
@@ -4651,7 +4663,7 @@
 </file>
 
 <file path=ppt/slideLayouts/slideLayout9.xml><?xml version="1.0" encoding="utf-8"?>
-<p:sldLayout xmlns:a="http://schemas.openxmlformats.org/drawingml/2006/main" xmlns:r="http://schemas.openxmlformats.org/officeDocument/2006/relationships" xmlns:p="http://schemas.openxmlformats.org/presentationml/2006/main" type="picTx" preserve="1">
+<p:sldLayout xmlns:a="http://purl.oclc.org/ooxml/drawingml/main" xmlns:r="http://purl.oclc.org/ooxml/officeDocument/relationships" xmlns:p="http://purl.oclc.org/ooxml/presentationml/main" type="picTx" preserve="1">
   <p:cSld name="Picture with Caption">
     <p:spTree>
       <p:nvGrpSpPr>
@@ -4842,7 +4854,7 @@
           <a:p>
             <a:fld id="{1CF16B7D-0063-428A-B5D3-BA448AD9F444}" type="datetimeFigureOut">
               <a:rPr lang="en-US" smtClean="0"/>
-              <a:t>3/2/2014</a:t>
+              <a:t>2/18/15</a:t>
             </a:fld>
             <a:endParaRPr lang="en-US"/>
           </a:p>
@@ -4904,7 +4916,7 @@
 </file>
 
 <file path=ppt/slideMasters/slideMaster1.xml><?xml version="1.0" encoding="utf-8"?>
-<p:sldMaster xmlns:a="http://schemas.openxmlformats.org/drawingml/2006/main" xmlns:r="http://schemas.openxmlformats.org/officeDocument/2006/relationships" xmlns:p="http://schemas.openxmlformats.org/presentationml/2006/main">
+<p:sldMaster xmlns:a="http://purl.oclc.org/ooxml/drawingml/main" xmlns:r="http://purl.oclc.org/ooxml/officeDocument/relationships" xmlns:p="http://purl.oclc.org/ooxml/presentationml/main">
   <p:cSld>
     <p:bg>
       <p:bgRef idx="1001">
@@ -5046,7 +5058,7 @@
               <a:defRPr sz="1200">
                 <a:solidFill>
                   <a:schemeClr val="tx1">
-                    <a:tint val="75000"/>
+                    <a:tint val="75%"/>
                   </a:schemeClr>
                 </a:solidFill>
               </a:defRPr>
@@ -5055,7 +5067,7 @@
           <a:p>
             <a:fld id="{1CF16B7D-0063-428A-B5D3-BA448AD9F444}" type="datetimeFigureOut">
               <a:rPr lang="en-US" smtClean="0"/>
-              <a:t>3/2/2014</a:t>
+              <a:t>2/18/15</a:t>
             </a:fld>
             <a:endParaRPr lang="en-US"/>
           </a:p>
@@ -5087,7 +5099,7 @@
               <a:defRPr sz="1200">
                 <a:solidFill>
                   <a:schemeClr val="tx1">
-                    <a:tint val="75000"/>
+                    <a:tint val="75%"/>
                   </a:schemeClr>
                 </a:solidFill>
               </a:defRPr>
@@ -5124,7 +5136,7 @@
               <a:defRPr sz="1200">
                 <a:solidFill>
                   <a:schemeClr val="tx1">
-                    <a:tint val="75000"/>
+                    <a:tint val="75%"/>
                   </a:schemeClr>
                 </a:solidFill>
               </a:defRPr>
@@ -5164,7 +5176,7 @@
     <p:titleStyle>
       <a:lvl1pPr algn="ctr" defTabSz="914400" rtl="0" eaLnBrk="1" latinLnBrk="0" hangingPunct="1">
         <a:spcBef>
-          <a:spcPct val="0"/>
+          <a:spcPct val="0%"/>
         </a:spcBef>
         <a:buNone/>
         <a:defRPr sz="4400" kern="1200">
@@ -5180,7 +5192,7 @@
     <p:bodyStyle>
       <a:lvl1pPr marL="342900" indent="-342900" algn="l" defTabSz="914400" rtl="0" eaLnBrk="1" latinLnBrk="0" hangingPunct="1">
         <a:spcBef>
-          <a:spcPct val="20000"/>
+          <a:spcPct val="20%"/>
         </a:spcBef>
         <a:buFont typeface="Arial" panose="020B0604020202020204" pitchFamily="34" charset="0"/>
         <a:buChar char="•"/>
@@ -5195,7 +5207,7 @@
       </a:lvl1pPr>
       <a:lvl2pPr marL="742950" indent="-285750" algn="l" defTabSz="914400" rtl="0" eaLnBrk="1" latinLnBrk="0" hangingPunct="1">
         <a:spcBef>
-          <a:spcPct val="20000"/>
+          <a:spcPct val="20%"/>
         </a:spcBef>
         <a:buFont typeface="Arial" panose="020B0604020202020204" pitchFamily="34" charset="0"/>
         <a:buChar char="–"/>
@@ -5210,7 +5222,7 @@
       </a:lvl2pPr>
       <a:lvl3pPr marL="1143000" indent="-228600" algn="l" defTabSz="914400" rtl="0" eaLnBrk="1" latinLnBrk="0" hangingPunct="1">
         <a:spcBef>
-          <a:spcPct val="20000"/>
+          <a:spcPct val="20%"/>
         </a:spcBef>
         <a:buFont typeface="Arial" panose="020B0604020202020204" pitchFamily="34" charset="0"/>
         <a:buChar char="•"/>
@@ -5225,7 +5237,7 @@
       </a:lvl3pPr>
       <a:lvl4pPr marL="1600200" indent="-228600" algn="l" defTabSz="914400" rtl="0" eaLnBrk="1" latinLnBrk="0" hangingPunct="1">
         <a:spcBef>
-          <a:spcPct val="20000"/>
+          <a:spcPct val="20%"/>
         </a:spcBef>
         <a:buFont typeface="Arial" panose="020B0604020202020204" pitchFamily="34" charset="0"/>
         <a:buChar char="–"/>
@@ -5240,7 +5252,7 @@
       </a:lvl4pPr>
       <a:lvl5pPr marL="2057400" indent="-228600" algn="l" defTabSz="914400" rtl="0" eaLnBrk="1" latinLnBrk="0" hangingPunct="1">
         <a:spcBef>
-          <a:spcPct val="20000"/>
+          <a:spcPct val="20%"/>
         </a:spcBef>
         <a:buFont typeface="Arial" panose="020B0604020202020204" pitchFamily="34" charset="0"/>
         <a:buChar char="»"/>
@@ -5255,7 +5267,7 @@
       </a:lvl5pPr>
       <a:lvl6pPr marL="2514600" indent="-228600" algn="l" defTabSz="914400" rtl="0" eaLnBrk="1" latinLnBrk="0" hangingPunct="1">
         <a:spcBef>
-          <a:spcPct val="20000"/>
+          <a:spcPct val="20%"/>
         </a:spcBef>
         <a:buFont typeface="Arial" panose="020B0604020202020204" pitchFamily="34" charset="0"/>
         <a:buChar char="•"/>
@@ -5270,7 +5282,7 @@
       </a:lvl6pPr>
       <a:lvl7pPr marL="2971800" indent="-228600" algn="l" defTabSz="914400" rtl="0" eaLnBrk="1" latinLnBrk="0" hangingPunct="1">
         <a:spcBef>
-          <a:spcPct val="20000"/>
+          <a:spcPct val="20%"/>
         </a:spcBef>
         <a:buFont typeface="Arial" panose="020B0604020202020204" pitchFamily="34" charset="0"/>
         <a:buChar char="•"/>
@@ -5285,7 +5297,7 @@
       </a:lvl7pPr>
       <a:lvl8pPr marL="3429000" indent="-228600" algn="l" defTabSz="914400" rtl="0" eaLnBrk="1" latinLnBrk="0" hangingPunct="1">
         <a:spcBef>
-          <a:spcPct val="20000"/>
+          <a:spcPct val="20%"/>
         </a:spcBef>
         <a:buFont typeface="Arial" panose="020B0604020202020204" pitchFamily="34" charset="0"/>
         <a:buChar char="•"/>
@@ -5300,7 +5312,7 @@
       </a:lvl8pPr>
       <a:lvl9pPr marL="3886200" indent="-228600" algn="l" defTabSz="914400" rtl="0" eaLnBrk="1" latinLnBrk="0" hangingPunct="1">
         <a:spcBef>
-          <a:spcPct val="20000"/>
+          <a:spcPct val="20%"/>
         </a:spcBef>
         <a:buFont typeface="Arial" panose="020B0604020202020204" pitchFamily="34" charset="0"/>
         <a:buChar char="•"/>
@@ -5414,7 +5426,7 @@
 </file>
 
 <file path=ppt/slides/slide1.xml><?xml version="1.0" encoding="utf-8"?>
-<p:sld xmlns:a="http://schemas.openxmlformats.org/drawingml/2006/main" xmlns:r="http://schemas.openxmlformats.org/officeDocument/2006/relationships" xmlns:p="http://schemas.openxmlformats.org/presentationml/2006/main">
+<p:sld xmlns:a="http://purl.oclc.org/ooxml/drawingml/main" xmlns:r="http://purl.oclc.org/ooxml/officeDocument/relationships" xmlns:p="http://purl.oclc.org/ooxml/presentationml/main">
   <p:cSld>
     <p:spTree>
       <p:nvGrpSpPr>
@@ -5448,7 +5460,7 @@
         </p:spPr>
         <p:txBody>
           <a:bodyPr>
-            <a:normAutofit fontScale="90000"/>
+            <a:normAutofit fontScale="90%"/>
           </a:bodyPr>
           <a:lstStyle/>
           <a:p>
@@ -5492,7 +5504,7 @@
         </p:spPr>
         <p:txBody>
           <a:bodyPr>
-            <a:normAutofit fontScale="92500" lnSpcReduction="20000"/>
+            <a:normAutofit fontScale="92.5%" lnSpcReduction="20%"/>
           </a:bodyPr>
           <a:lstStyle/>
           <a:p>
@@ -5525,11 +5537,7 @@
           <a:p>
             <a:r>
               <a:rPr lang="en-US" sz="2200" dirty="0" smtClean="0"/>
-              <a:t>2 </a:t>
-            </a:r>
-            <a:r>
-              <a:rPr lang="en-US" sz="2200" dirty="0" smtClean="0"/>
-              <a:t>March 2014</a:t>
+              <a:t>2 March 2014</a:t>
             </a:r>
             <a:endParaRPr lang="en-US" sz="2200" dirty="0"/>
           </a:p>
@@ -5556,7 +5564,7 @@
 </file>
 
 <file path=ppt/slides/slide10.xml><?xml version="1.0" encoding="utf-8"?>
-<p:sld xmlns:a="http://schemas.openxmlformats.org/drawingml/2006/main" xmlns:r="http://schemas.openxmlformats.org/officeDocument/2006/relationships" xmlns:p="http://schemas.openxmlformats.org/presentationml/2006/main">
+<p:sld xmlns:a="http://purl.oclc.org/ooxml/drawingml/main" xmlns:r="http://purl.oclc.org/ooxml/officeDocument/relationships" xmlns:p="http://purl.oclc.org/ooxml/presentationml/main">
   <p:cSld>
     <p:spTree>
       <p:nvGrpSpPr>
@@ -5618,7 +5626,7 @@
                 <a:solidFill>
                   <a:schemeClr val="tx1"/>
                 </a:solidFill>
-                <a:miter lim="800000"/>
+                <a:miter lim="800%"/>
                 <a:headEnd/>
                 <a:tailEnd/>
               </a14:hiddenLine>
@@ -5644,7 +5652,7 @@
         </p:spPr>
         <p:txBody>
           <a:bodyPr>
-            <a:normAutofit fontScale="90000"/>
+            <a:normAutofit fontScale="90%"/>
           </a:bodyPr>
           <a:lstStyle/>
           <a:p>
@@ -5712,7 +5720,7 @@
 </file>
 
 <file path=ppt/slides/slide11.xml><?xml version="1.0" encoding="utf-8"?>
-<p:sld xmlns:a="http://schemas.openxmlformats.org/drawingml/2006/main" xmlns:r="http://schemas.openxmlformats.org/officeDocument/2006/relationships" xmlns:p="http://schemas.openxmlformats.org/presentationml/2006/main">
+<p:sld xmlns:a="http://purl.oclc.org/ooxml/drawingml/main" xmlns:r="http://purl.oclc.org/ooxml/officeDocument/relationships" xmlns:p="http://purl.oclc.org/ooxml/presentationml/main">
   <p:cSld>
     <p:spTree>
       <p:nvGrpSpPr>
@@ -5746,7 +5754,7 @@
         </p:spPr>
         <p:txBody>
           <a:bodyPr>
-            <a:normAutofit fontScale="90000"/>
+            <a:normAutofit fontScale="90%"/>
           </a:bodyPr>
           <a:lstStyle/>
           <a:p>
@@ -5827,13 +5835,8 @@
           <a:p>
             <a:r>
               <a:rPr lang="en-US" dirty="0" smtClean="0"/>
-              <a:t>Stealth, Surprise, Coherence, Uncertainty, Flexibility, </a:t>
-            </a:r>
-            <a:r>
-              <a:rPr lang="en-US" dirty="0" smtClean="0"/>
-              <a:t>Scalability</a:t>
-            </a:r>
-            <a:endParaRPr lang="en-US" dirty="0" smtClean="0"/>
+              <a:t>Stealth, Surprise, Coherence, Uncertainty, Flexibility, Scalability</a:t>
+            </a:r>
           </a:p>
           <a:p>
             <a:pPr marL="0" indent="0">
@@ -5861,7 +5864,7 @@
         <p:style>
           <a:lnRef idx="2">
             <a:schemeClr val="accent1">
-              <a:shade val="50000"/>
+              <a:shade val="50%"/>
             </a:schemeClr>
           </a:lnRef>
           <a:fillRef idx="1">
@@ -5969,12 +5972,12 @@
                                         </p:attrNameLst>
                                       </p:cBhvr>
                                       <p:tavLst>
-                                        <p:tav tm="0">
+                                        <p:tav tm="0%">
                                           <p:val>
                                             <p:strVal val="1+#ppt_w/2"/>
                                           </p:val>
                                         </p:tav>
-                                        <p:tav tm="100000">
+                                        <p:tav tm="100%">
                                           <p:val>
                                             <p:strVal val="#ppt_x"/>
                                           </p:val>
@@ -5992,12 +5995,12 @@
                                         </p:attrNameLst>
                                       </p:cBhvr>
                                       <p:tavLst>
-                                        <p:tav tm="0">
+                                        <p:tav tm="0%">
                                           <p:val>
                                             <p:strVal val="#ppt_y"/>
                                           </p:val>
                                         </p:tav>
-                                        <p:tav tm="100000">
+                                        <p:tav tm="100%">
                                           <p:val>
                                             <p:strVal val="#ppt_y"/>
                                           </p:val>
@@ -6042,7 +6045,7 @@
 </file>
 
 <file path=ppt/slides/slide12.xml><?xml version="1.0" encoding="utf-8"?>
-<p:sld xmlns:a="http://schemas.openxmlformats.org/drawingml/2006/main" xmlns:r="http://schemas.openxmlformats.org/officeDocument/2006/relationships" xmlns:p="http://schemas.openxmlformats.org/presentationml/2006/main">
+<p:sld xmlns:a="http://purl.oclc.org/ooxml/drawingml/main" xmlns:r="http://purl.oclc.org/ooxml/officeDocument/relationships" xmlns:p="http://purl.oclc.org/ooxml/presentationml/main">
   <p:cSld>
     <p:spTree>
       <p:nvGrpSpPr>
@@ -6125,30 +6128,14 @@
             <a:pPr lvl="1"/>
             <a:r>
               <a:rPr lang="en-US" dirty="0" smtClean="0"/>
-              <a:t>Quiet </a:t>
-            </a:r>
-            <a:r>
-              <a:rPr lang="en-US" dirty="0" smtClean="0"/>
-              <a:t>vessels, unmanned systems </a:t>
-            </a:r>
-            <a:r>
-              <a:rPr lang="en-US" dirty="0" smtClean="0"/>
-              <a:t>can still listen</a:t>
+              <a:t>Quiet vessels, unmanned systems can still listen</a:t>
             </a:r>
           </a:p>
           <a:p>
             <a:pPr lvl="1"/>
             <a:r>
               <a:rPr lang="en-US" dirty="0" smtClean="0"/>
-              <a:t>Forward-deployed </a:t>
-            </a:r>
-            <a:r>
-              <a:rPr lang="en-US" dirty="0" smtClean="0"/>
-              <a:t>units will </a:t>
-            </a:r>
-            <a:r>
-              <a:rPr lang="en-US" dirty="0" smtClean="0"/>
-              <a:t>occasionally need to report critical new information</a:t>
+              <a:t>Forward-deployed units will occasionally need to report critical new information</a:t>
             </a:r>
           </a:p>
           <a:p>
@@ -6196,7 +6183,7 @@
 </file>
 
 <file path=ppt/slides/slide13.xml><?xml version="1.0" encoding="utf-8"?>
-<p:sld xmlns:a="http://schemas.openxmlformats.org/drawingml/2006/main" xmlns:r="http://schemas.openxmlformats.org/officeDocument/2006/relationships" xmlns:p="http://schemas.openxmlformats.org/presentationml/2006/main">
+<p:sld xmlns:a="http://purl.oclc.org/ooxml/drawingml/main" xmlns:r="http://purl.oclc.org/ooxml/officeDocument/relationships" xmlns:p="http://purl.oclc.org/ooxml/presentationml/main">
   <p:cSld>
     <p:spTree>
       <p:nvGrpSpPr>
@@ -6269,7 +6256,7 @@
           <a:ext cx="8534399" cy="4124960"/>
         </p:xfrm>
         <a:graphic>
-          <a:graphicData uri="http://schemas.openxmlformats.org/drawingml/2006/table">
+          <a:graphicData uri="http://purl.oclc.org/ooxml/drawingml/table">
             <a:tbl>
               <a:tblPr firstRow="1" bandRow="1">
                 <a:tableStyleId>{5C22544A-7EE6-4342-B048-85BDC9FD1C3A}</a:tableStyleId>
@@ -6703,7 +6690,7 @@
                     <a:lstStyle/>
                     <a:p>
                       <a:r>
-                        <a:rPr lang="en-US" sz="1600" baseline="0" dirty="0" smtClean="0"/>
+                        <a:rPr lang="en-US" sz="1600" baseline="0%" dirty="0" smtClean="0"/>
                         <a:t>Chatty, “internet”</a:t>
                       </a:r>
                     </a:p>
@@ -6713,7 +6700,7 @@
                         <a:t>Relies</a:t>
                       </a:r>
                       <a:r>
-                        <a:rPr lang="en-US" sz="1600" baseline="0" dirty="0" smtClean="0"/>
+                        <a:rPr lang="en-US" sz="1600" baseline="0%" dirty="0" smtClean="0"/>
                         <a:t> on bandwidth</a:t>
                       </a:r>
                     </a:p>
@@ -6743,7 +6730,7 @@
                         <a:t>Monitor, receive Often-quiet</a:t>
                       </a:r>
                       <a:r>
-                        <a:rPr lang="en-US" sz="1600" baseline="0" dirty="0" smtClean="0"/>
+                        <a:rPr lang="en-US" sz="1600" baseline="0%" dirty="0" smtClean="0"/>
                         <a:t> circuits</a:t>
                       </a:r>
                       <a:endParaRPr lang="en-US" sz="1600" dirty="0"/>
@@ -6812,13 +6799,13 @@
                     <a:lstStyle/>
                     <a:p>
                       <a:r>
-                        <a:rPr lang="en-US" sz="1600" baseline="0" dirty="0" smtClean="0"/>
+                        <a:rPr lang="en-US" sz="1600" baseline="0%" dirty="0" smtClean="0"/>
                         <a:t>Synchronized</a:t>
                       </a:r>
                     </a:p>
                     <a:p>
                       <a:r>
-                        <a:rPr lang="en-US" sz="1600" baseline="0" dirty="0" smtClean="0"/>
+                        <a:rPr lang="en-US" sz="1600" baseline="0%" dirty="0" smtClean="0"/>
                         <a:t>Fully linked</a:t>
                       </a:r>
                       <a:endParaRPr lang="en-US" sz="1600" dirty="0"/>
@@ -6836,13 +6823,13 @@
                         <a:t>OPORD</a:t>
                       </a:r>
                       <a:r>
-                        <a:rPr lang="en-US" sz="1600" baseline="0" dirty="0" smtClean="0"/>
+                        <a:rPr lang="en-US" sz="1600" baseline="0%" dirty="0" smtClean="0"/>
                         <a:t> transitions</a:t>
                       </a:r>
                     </a:p>
                     <a:p>
                       <a:r>
-                        <a:rPr lang="en-US" sz="1600" baseline="0" dirty="0" smtClean="0"/>
+                        <a:rPr lang="en-US" sz="1600" baseline="0%" dirty="0" smtClean="0"/>
                         <a:t>AIS, sharable info</a:t>
                       </a:r>
                       <a:endParaRPr lang="en-US" sz="1600" dirty="0"/>
@@ -6880,7 +6867,7 @@
                         <a:t>Loosely</a:t>
                       </a:r>
                       <a:r>
-                        <a:rPr lang="en-US" sz="1600" baseline="0" dirty="0" smtClean="0"/>
+                        <a:rPr lang="en-US" sz="1600" baseline="0%" dirty="0" smtClean="0"/>
                         <a:t> coupled command, ops</a:t>
                       </a:r>
                       <a:endParaRPr lang="en-US" sz="1600" dirty="0"/>
@@ -6925,7 +6912,7 @@
                         <a:t>Plethora</a:t>
                       </a:r>
                       <a:r>
-                        <a:rPr lang="en-US" sz="1600" baseline="0" dirty="0" smtClean="0"/>
+                        <a:rPr lang="en-US" sz="1600" baseline="0%" dirty="0" smtClean="0"/>
                         <a:t> of formats</a:t>
                       </a:r>
                       <a:endParaRPr lang="en-US" sz="1600" dirty="0" smtClean="0"/>
@@ -6952,7 +6939,7 @@
                         <a:t>Some</a:t>
                       </a:r>
                       <a:r>
-                        <a:rPr lang="en-US" sz="1600" baseline="0" dirty="0" smtClean="0"/>
+                        <a:rPr lang="en-US" sz="1600" baseline="0%" dirty="0" smtClean="0"/>
                         <a:t> data needed</a:t>
                       </a:r>
                       <a:endParaRPr lang="en-US" sz="1600" dirty="0"/>
@@ -6966,7 +6953,7 @@
                     <a:lstStyle/>
                     <a:p>
                       <a:r>
-                        <a:rPr lang="en-US" sz="1600" baseline="0" dirty="0" smtClean="0"/>
+                        <a:rPr lang="en-US" sz="1600" baseline="0%" dirty="0" smtClean="0"/>
                         <a:t>Rare compressed m</a:t>
                       </a:r>
                       <a:r>
@@ -6988,7 +6975,7 @@
                         <a:t>Low power</a:t>
                       </a:r>
                       <a:r>
-                        <a:rPr lang="en-US" sz="1600" baseline="0" dirty="0" smtClean="0"/>
+                        <a:rPr lang="en-US" sz="1600" baseline="0%" dirty="0" smtClean="0"/>
                         <a:t> for system endurance</a:t>
                       </a:r>
                       <a:endParaRPr lang="en-US" sz="1600" dirty="0"/>
@@ -7047,13 +7034,13 @@
                         <a:t>High-interest</a:t>
                       </a:r>
                       <a:r>
-                        <a:rPr lang="en-US" sz="1600" baseline="0" dirty="0" smtClean="0"/>
+                        <a:rPr lang="en-US" sz="1600" baseline="0%" dirty="0" smtClean="0"/>
                         <a:t> data</a:t>
                       </a:r>
                     </a:p>
                     <a:p>
                       <a:r>
-                        <a:rPr lang="en-US" sz="1600" baseline="0" dirty="0" smtClean="0"/>
+                        <a:rPr lang="en-US" sz="1600" baseline="0%" dirty="0" smtClean="0"/>
                         <a:t>IFFN, unknowns</a:t>
                       </a:r>
                       <a:endParaRPr lang="en-US" sz="1600" dirty="0"/>
@@ -7085,7 +7072,7 @@
                         <a:t>Passive EM,</a:t>
                       </a:r>
                       <a:r>
-                        <a:rPr lang="en-US" sz="1600" baseline="0" dirty="0" smtClean="0"/>
+                        <a:rPr lang="en-US" sz="1600" baseline="0%" dirty="0" smtClean="0"/>
                         <a:t> </a:t>
                       </a:r>
                       <a:r>
@@ -7140,7 +7127,7 @@
                         <a:t>Not a</a:t>
                       </a:r>
                       <a:r>
-                        <a:rPr lang="en-US" sz="1600" baseline="0" dirty="0" smtClean="0"/>
+                        <a:rPr lang="en-US" sz="1600" baseline="0%" dirty="0" smtClean="0"/>
                         <a:t> commodity</a:t>
                       </a:r>
                       <a:endParaRPr lang="en-US" sz="1600" dirty="0"/>
@@ -7164,13 +7151,13 @@
                         <a:t>LORAN-C</a:t>
                       </a:r>
                       <a:r>
-                        <a:rPr lang="en-US" sz="1600" baseline="0" dirty="0" smtClean="0"/>
+                        <a:rPr lang="en-US" sz="1600" baseline="0%" dirty="0" smtClean="0"/>
                         <a:t> (maybe)</a:t>
                       </a:r>
                     </a:p>
                     <a:p>
                       <a:r>
-                        <a:rPr lang="en-US" sz="1600" baseline="0" dirty="0" smtClean="0"/>
+                        <a:rPr lang="en-US" sz="1600" baseline="0%" dirty="0" smtClean="0"/>
                         <a:t>Time synchronize</a:t>
                       </a:r>
                       <a:endParaRPr lang="en-US" sz="1600" dirty="0"/>
@@ -7188,7 +7175,7 @@
                         <a:t>A2AD response:</a:t>
                       </a:r>
                       <a:r>
-                        <a:rPr lang="en-US" sz="1600" baseline="0" dirty="0" smtClean="0"/>
+                        <a:rPr lang="en-US" sz="1600" baseline="0%" dirty="0" smtClean="0"/>
                         <a:t> availability report or fix queries?</a:t>
                       </a:r>
                       <a:endParaRPr lang="en-US" sz="1600" dirty="0"/>
@@ -7206,7 +7193,7 @@
                         <a:t>Inertial,</a:t>
                       </a:r>
                       <a:r>
-                        <a:rPr lang="en-US" sz="1600" baseline="0" dirty="0" smtClean="0"/>
+                        <a:rPr lang="en-US" sz="1600" baseline="0%" dirty="0" smtClean="0"/>
                         <a:t> celestial, bathymetric, visual alternative sources</a:t>
                       </a:r>
                       <a:endParaRPr lang="en-US" sz="1600" dirty="0"/>
@@ -7411,7 +7398,7 @@
         <p:style>
           <a:lnRef idx="2">
             <a:schemeClr val="accent1">
-              <a:shade val="50000"/>
+              <a:shade val="50%"/>
             </a:schemeClr>
           </a:lnRef>
           <a:fillRef idx="1">
@@ -7523,12 +7510,12 @@
                                         </p:attrNameLst>
                                       </p:cBhvr>
                                       <p:tavLst>
-                                        <p:tav tm="0">
+                                        <p:tav tm="0%">
                                           <p:val>
                                             <p:strVal val="#ppt_x"/>
                                           </p:val>
                                         </p:tav>
-                                        <p:tav tm="100000">
+                                        <p:tav tm="100%">
                                           <p:val>
                                             <p:strVal val="#ppt_x"/>
                                           </p:val>
@@ -7546,12 +7533,12 @@
                                         </p:attrNameLst>
                                       </p:cBhvr>
                                       <p:tavLst>
-                                        <p:tav tm="0">
+                                        <p:tav tm="0%">
                                           <p:val>
                                             <p:strVal val="1+#ppt_h/2"/>
                                           </p:val>
                                         </p:tav>
-                                        <p:tav tm="100000">
+                                        <p:tav tm="100%">
                                           <p:val>
                                             <p:strVal val="#ppt_y"/>
                                           </p:val>
@@ -7596,12 +7583,12 @@
                                         </p:attrNameLst>
                                       </p:cBhvr>
                                       <p:tavLst>
-                                        <p:tav tm="0">
+                                        <p:tav tm="0%">
                                           <p:val>
                                             <p:strVal val="#ppt_x"/>
                                           </p:val>
                                         </p:tav>
-                                        <p:tav tm="100000">
+                                        <p:tav tm="100%">
                                           <p:val>
                                             <p:strVal val="#ppt_x"/>
                                           </p:val>
@@ -7619,12 +7606,12 @@
                                         </p:attrNameLst>
                                       </p:cBhvr>
                                       <p:tavLst>
-                                        <p:tav tm="0">
+                                        <p:tav tm="0%">
                                           <p:val>
                                             <p:strVal val="1+#ppt_h/2"/>
                                           </p:val>
                                         </p:tav>
-                                        <p:tav tm="100000">
+                                        <p:tav tm="100%">
                                           <p:val>
                                             <p:strVal val="#ppt_y"/>
                                           </p:val>
@@ -7670,7 +7657,7 @@
 </file>
 
 <file path=ppt/slides/slide14.xml><?xml version="1.0" encoding="utf-8"?>
-<p:sld xmlns:a="http://schemas.openxmlformats.org/drawingml/2006/main" xmlns:r="http://schemas.openxmlformats.org/officeDocument/2006/relationships" xmlns:p="http://schemas.openxmlformats.org/presentationml/2006/main">
+<p:sld xmlns:a="http://purl.oclc.org/ooxml/drawingml/main" xmlns:r="http://purl.oclc.org/ooxml/officeDocument/relationships" xmlns:p="http://purl.oclc.org/ooxml/presentationml/main">
   <p:cSld>
     <p:spTree>
       <p:nvGrpSpPr>
@@ -7727,7 +7714,7 @@
         </p:spPr>
         <p:txBody>
           <a:bodyPr>
-            <a:normAutofit fontScale="92500"/>
+            <a:normAutofit fontScale="92.5%"/>
           </a:bodyPr>
           <a:lstStyle/>
           <a:p>
@@ -7765,7 +7752,7 @@
 </file>
 
 <file path=ppt/slides/slide15.xml><?xml version="1.0" encoding="utf-8"?>
-<p:sld xmlns:a="http://schemas.openxmlformats.org/drawingml/2006/main" xmlns:r="http://schemas.openxmlformats.org/officeDocument/2006/relationships" xmlns:p="http://schemas.openxmlformats.org/presentationml/2006/main">
+<p:sld xmlns:a="http://purl.oclc.org/ooxml/drawingml/main" xmlns:r="http://purl.oclc.org/ooxml/officeDocument/relationships" xmlns:p="http://purl.oclc.org/ooxml/presentationml/main">
   <p:cSld>
     <p:spTree>
       <p:nvGrpSpPr>
@@ -7822,7 +7809,7 @@
         </p:spPr>
         <p:txBody>
           <a:bodyPr>
-            <a:normAutofit fontScale="77500" lnSpcReduction="20000"/>
+            <a:normAutofit fontScale="77.5%" lnSpcReduction="20%"/>
           </a:bodyPr>
           <a:lstStyle/>
           <a:p>
@@ -7878,21 +7865,8 @@
           <a:p>
             <a:r>
               <a:rPr lang="en-US" dirty="0" smtClean="0"/>
-              <a:t>Tactically </a:t>
-            </a:r>
-            <a:r>
-              <a:rPr lang="en-US" dirty="0" smtClean="0"/>
-              <a:t>important </a:t>
-            </a:r>
-            <a:r>
-              <a:rPr lang="en-US" dirty="0" smtClean="0"/>
-              <a:t>new applications </a:t>
-            </a:r>
-            <a:r>
-              <a:rPr lang="en-US" dirty="0" smtClean="0"/>
-              <a:t>are possible</a:t>
-            </a:r>
-            <a:endParaRPr lang="en-US" dirty="0" smtClean="0"/>
+              <a:t>Tactically important new applications are possible</a:t>
+            </a:r>
           </a:p>
           <a:p>
             <a:endParaRPr lang="en-US" dirty="0" smtClean="0"/>
@@ -7948,7 +7922,7 @@
 </file>
 
 <file path=ppt/slides/slide16.xml><?xml version="1.0" encoding="utf-8"?>
-<p:sld xmlns:a="http://schemas.openxmlformats.org/drawingml/2006/main" xmlns:r="http://schemas.openxmlformats.org/officeDocument/2006/relationships" xmlns:p="http://schemas.openxmlformats.org/presentationml/2006/main">
+<p:sld xmlns:a="http://purl.oclc.org/ooxml/drawingml/main" xmlns:r="http://purl.oclc.org/ooxml/officeDocument/relationships" xmlns:p="http://purl.oclc.org/ooxml/presentationml/main">
   <p:cSld>
     <p:spTree>
       <p:nvGrpSpPr>
@@ -8010,7 +7984,7 @@
                 <a:solidFill>
                   <a:schemeClr val="tx1"/>
                 </a:solidFill>
-                <a:miter lim="800000"/>
+                <a:miter lim="800%"/>
                 <a:headEnd/>
                 <a:tailEnd/>
               </a14:hiddenLine>
@@ -8039,7 +8013,7 @@
 </file>
 
 <file path=ppt/slides/slide17.xml><?xml version="1.0" encoding="utf-8"?>
-<p:sld xmlns:a="http://schemas.openxmlformats.org/drawingml/2006/main" xmlns:r="http://schemas.openxmlformats.org/officeDocument/2006/relationships" xmlns:p="http://schemas.openxmlformats.org/presentationml/2006/main">
+<p:sld xmlns:a="http://purl.oclc.org/ooxml/drawingml/main" xmlns:r="http://purl.oclc.org/ooxml/officeDocument/relationships" xmlns:p="http://purl.oclc.org/ooxml/presentationml/main">
   <p:cSld>
     <p:spTree>
       <p:nvGrpSpPr>
@@ -8096,7 +8070,7 @@
         </p:spPr>
         <p:txBody>
           <a:bodyPr>
-            <a:normAutofit lnSpcReduction="10000"/>
+            <a:normAutofit lnSpcReduction="10%"/>
           </a:bodyPr>
           <a:lstStyle/>
           <a:p>
@@ -8144,7 +8118,7 @@
             <a:solidFill>
               <a:schemeClr val="tx1"/>
             </a:solidFill>
-            <a:miter lim="800000"/>
+            <a:miter lim="800%"/>
             <a:headEnd/>
             <a:tailEnd/>
           </a:ln>
@@ -8183,7 +8157,7 @@
           <a:lstStyle>
             <a:lvl1pPr marL="342900" indent="-342900" algn="l" defTabSz="914400" rtl="0" eaLnBrk="1" latinLnBrk="0" hangingPunct="1">
               <a:spcBef>
-                <a:spcPct val="20000"/>
+                <a:spcPct val="20%"/>
               </a:spcBef>
               <a:buFont typeface="Arial" panose="020B0604020202020204" pitchFamily="34" charset="0"/>
               <a:buChar char="•"/>
@@ -8198,7 +8172,7 @@
             </a:lvl1pPr>
             <a:lvl2pPr marL="742950" indent="-285750" algn="l" defTabSz="914400" rtl="0" eaLnBrk="1" latinLnBrk="0" hangingPunct="1">
               <a:spcBef>
-                <a:spcPct val="20000"/>
+                <a:spcPct val="20%"/>
               </a:spcBef>
               <a:buFont typeface="Arial" panose="020B0604020202020204" pitchFamily="34" charset="0"/>
               <a:buChar char="–"/>
@@ -8213,7 +8187,7 @@
             </a:lvl2pPr>
             <a:lvl3pPr marL="1143000" indent="-228600" algn="l" defTabSz="914400" rtl="0" eaLnBrk="1" latinLnBrk="0" hangingPunct="1">
               <a:spcBef>
-                <a:spcPct val="20000"/>
+                <a:spcPct val="20%"/>
               </a:spcBef>
               <a:buFont typeface="Arial" panose="020B0604020202020204" pitchFamily="34" charset="0"/>
               <a:buChar char="•"/>
@@ -8228,7 +8202,7 @@
             </a:lvl3pPr>
             <a:lvl4pPr marL="1600200" indent="-228600" algn="l" defTabSz="914400" rtl="0" eaLnBrk="1" latinLnBrk="0" hangingPunct="1">
               <a:spcBef>
-                <a:spcPct val="20000"/>
+                <a:spcPct val="20%"/>
               </a:spcBef>
               <a:buFont typeface="Arial" panose="020B0604020202020204" pitchFamily="34" charset="0"/>
               <a:buChar char="–"/>
@@ -8243,7 +8217,7 @@
             </a:lvl4pPr>
             <a:lvl5pPr marL="2057400" indent="-228600" algn="l" defTabSz="914400" rtl="0" eaLnBrk="1" latinLnBrk="0" hangingPunct="1">
               <a:spcBef>
-                <a:spcPct val="20000"/>
+                <a:spcPct val="20%"/>
               </a:spcBef>
               <a:buFont typeface="Arial" panose="020B0604020202020204" pitchFamily="34" charset="0"/>
               <a:buChar char="»"/>
@@ -8258,7 +8232,7 @@
             </a:lvl5pPr>
             <a:lvl6pPr marL="2514600" indent="-228600" algn="l" defTabSz="914400" rtl="0" eaLnBrk="1" latinLnBrk="0" hangingPunct="1">
               <a:spcBef>
-                <a:spcPct val="20000"/>
+                <a:spcPct val="20%"/>
               </a:spcBef>
               <a:buFont typeface="Arial" panose="020B0604020202020204" pitchFamily="34" charset="0"/>
               <a:buChar char="•"/>
@@ -8273,7 +8247,7 @@
             </a:lvl6pPr>
             <a:lvl7pPr marL="2971800" indent="-228600" algn="l" defTabSz="914400" rtl="0" eaLnBrk="1" latinLnBrk="0" hangingPunct="1">
               <a:spcBef>
-                <a:spcPct val="20000"/>
+                <a:spcPct val="20%"/>
               </a:spcBef>
               <a:buFont typeface="Arial" panose="020B0604020202020204" pitchFamily="34" charset="0"/>
               <a:buChar char="•"/>
@@ -8288,7 +8262,7 @@
             </a:lvl7pPr>
             <a:lvl8pPr marL="3429000" indent="-228600" algn="l" defTabSz="914400" rtl="0" eaLnBrk="1" latinLnBrk="0" hangingPunct="1">
               <a:spcBef>
-                <a:spcPct val="20000"/>
+                <a:spcPct val="20%"/>
               </a:spcBef>
               <a:buFont typeface="Arial" panose="020B0604020202020204" pitchFamily="34" charset="0"/>
               <a:buChar char="•"/>
@@ -8303,7 +8277,7 @@
             </a:lvl8pPr>
             <a:lvl9pPr marL="3886200" indent="-228600" algn="l" defTabSz="914400" rtl="0" eaLnBrk="1" latinLnBrk="0" hangingPunct="1">
               <a:spcBef>
-                <a:spcPct val="20000"/>
+                <a:spcPct val="20%"/>
               </a:spcBef>
               <a:buFont typeface="Arial" panose="020B0604020202020204" pitchFamily="34" charset="0"/>
               <a:buChar char="•"/>
@@ -8324,13 +8298,8 @@
             </a:pPr>
             <a:r>
               <a:rPr lang="en-US" dirty="0" smtClean="0"/>
-              <a:t>Summary: </a:t>
-            </a:r>
-            <a:r>
-              <a:rPr lang="en-US" dirty="0" smtClean="0"/>
-              <a:t>QR codes work</a:t>
-            </a:r>
-            <a:endParaRPr lang="en-US" dirty="0" smtClean="0"/>
+              <a:t>Summary: QR codes work</a:t>
+            </a:r>
           </a:p>
         </p:txBody>
       </p:sp>
@@ -8402,12 +8371,12 @@
                                         </p:attrNameLst>
                                       </p:cBhvr>
                                       <p:tavLst>
-                                        <p:tav tm="0">
+                                        <p:tav tm="0%">
                                           <p:val>
                                             <p:strVal val="#ppt_x"/>
                                           </p:val>
                                         </p:tav>
-                                        <p:tav tm="100000">
+                                        <p:tav tm="100%">
                                           <p:val>
                                             <p:strVal val="#ppt_x"/>
                                           </p:val>
@@ -8425,12 +8394,12 @@
                                         </p:attrNameLst>
                                       </p:cBhvr>
                                       <p:tavLst>
-                                        <p:tav tm="0">
+                                        <p:tav tm="0%">
                                           <p:val>
                                             <p:strVal val="0-#ppt_h/2"/>
                                           </p:val>
                                         </p:tav>
-                                        <p:tav tm="100000">
+                                        <p:tav tm="100%">
                                           <p:val>
                                             <p:strVal val="#ppt_y"/>
                                           </p:val>
@@ -8492,12 +8461,12 @@
                                         </p:attrNameLst>
                                       </p:cBhvr>
                                       <p:tavLst>
-                                        <p:tav tm="0">
+                                        <p:tav tm="0%">
                                           <p:val>
                                             <p:strVal val="#ppt_x"/>
                                           </p:val>
                                         </p:tav>
-                                        <p:tav tm="100000">
+                                        <p:tav tm="100%">
                                           <p:val>
                                             <p:strVal val="#ppt_x"/>
                                           </p:val>
@@ -8519,12 +8488,12 @@
                                         </p:attrNameLst>
                                       </p:cBhvr>
                                       <p:tavLst>
-                                        <p:tav tm="0">
+                                        <p:tav tm="0%">
                                           <p:val>
                                             <p:strVal val="1+#ppt_h/2"/>
                                           </p:val>
                                         </p:tav>
-                                        <p:tav tm="100000">
+                                        <p:tav tm="100%">
                                           <p:val>
                                             <p:strVal val="#ppt_y"/>
                                           </p:val>
@@ -8570,7 +8539,7 @@
 </file>
 
 <file path=ppt/slides/slide18.xml><?xml version="1.0" encoding="utf-8"?>
-<p:sld xmlns:a="http://schemas.openxmlformats.org/drawingml/2006/main" xmlns:r="http://schemas.openxmlformats.org/officeDocument/2006/relationships" xmlns:p="http://schemas.openxmlformats.org/presentationml/2006/main">
+<p:sld xmlns:a="http://purl.oclc.org/ooxml/drawingml/main" xmlns:r="http://purl.oclc.org/ooxml/officeDocument/relationships" xmlns:p="http://purl.oclc.org/ooxml/presentationml/main">
   <p:cSld>
     <p:spTree>
       <p:nvGrpSpPr>
@@ -8645,7 +8614,7 @@
         </p:spPr>
         <p:txBody>
           <a:bodyPr>
-            <a:normAutofit fontScale="90000"/>
+            <a:normAutofit fontScale="90%"/>
           </a:bodyPr>
           <a:lstStyle/>
           <a:p>
@@ -8754,7 +8723,7 @@
                 <a:solidFill>
                   <a:schemeClr val="tx1"/>
                 </a:solidFill>
-                <a:miter lim="800000"/>
+                <a:miter lim="800%"/>
                 <a:headEnd/>
                 <a:tailEnd/>
               </a14:hiddenLine>
@@ -8839,7 +8808,7 @@
                 <a:solidFill>
                   <a:schemeClr val="tx1"/>
                 </a:solidFill>
-                <a:miter lim="800000"/>
+                <a:miter lim="800%"/>
                 <a:headEnd/>
                 <a:tailEnd/>
               </a14:hiddenLine>
@@ -8903,11 +8872,7 @@
             <a:pPr algn="ctr"/>
             <a:r>
               <a:rPr lang="en-US" dirty="0" smtClean="0"/>
-              <a:t>Interlaced display is inherently </a:t>
-            </a:r>
-            <a:r>
-              <a:rPr lang="en-US" dirty="0" smtClean="0"/>
-              <a:t>distorted, but nearby handheld captured all text</a:t>
+              <a:t>Interlaced display is inherently distorted, but nearby handheld captured all text</a:t>
             </a:r>
             <a:endParaRPr lang="en-US" dirty="0"/>
           </a:p>
@@ -8938,15 +8903,7 @@
             <a:pPr algn="ctr"/>
             <a:r>
               <a:rPr lang="en-US" dirty="0" smtClean="0"/>
-              <a:t>4K video </a:t>
-            </a:r>
-            <a:r>
-              <a:rPr lang="en-US" dirty="0" smtClean="0"/>
-              <a:t>uses progressive </a:t>
-            </a:r>
-            <a:r>
-              <a:rPr lang="en-US" dirty="0" smtClean="0"/>
-              <a:t>display instead, allowing capture at far greater ranges</a:t>
+              <a:t>4K video uses progressive display instead, allowing capture at far greater ranges</a:t>
             </a:r>
             <a:endParaRPr lang="en-US" dirty="0"/>
           </a:p>
@@ -8973,7 +8930,7 @@
 </file>
 
 <file path=ppt/slides/slide19.xml><?xml version="1.0" encoding="utf-8"?>
-<p:sld xmlns:a="http://schemas.openxmlformats.org/drawingml/2006/main" xmlns:r="http://schemas.openxmlformats.org/officeDocument/2006/relationships" xmlns:p="http://schemas.openxmlformats.org/presentationml/2006/main">
+<p:sld xmlns:a="http://purl.oclc.org/ooxml/drawingml/main" xmlns:r="http://purl.oclc.org/ooxml/officeDocument/relationships" xmlns:p="http://purl.oclc.org/ooxml/presentationml/main">
   <p:cSld>
     <p:spTree>
       <p:nvGrpSpPr>
@@ -9007,7 +8964,7 @@
         </p:spPr>
         <p:txBody>
           <a:bodyPr>
-            <a:normAutofit fontScale="90000"/>
+            <a:normAutofit fontScale="90%"/>
           </a:bodyPr>
           <a:lstStyle/>
           <a:p>
@@ -9037,7 +8994,7 @@
         </p:spPr>
         <p:txBody>
           <a:bodyPr>
-            <a:normAutofit fontScale="92500"/>
+            <a:normAutofit fontScale="92.5%"/>
           </a:bodyPr>
           <a:lstStyle/>
           <a:p>
@@ -9130,7 +9087,7 @@
 </file>
 
 <file path=ppt/slides/slide2.xml><?xml version="1.0" encoding="utf-8"?>
-<p:sld xmlns:a="http://schemas.openxmlformats.org/drawingml/2006/main" xmlns:r="http://schemas.openxmlformats.org/officeDocument/2006/relationships" xmlns:p="http://schemas.openxmlformats.org/presentationml/2006/main">
+<p:sld xmlns:a="http://purl.oclc.org/ooxml/drawingml/main" xmlns:r="http://purl.oclc.org/ooxml/officeDocument/relationships" xmlns:p="http://purl.oclc.org/ooxml/presentationml/main">
   <p:cSld>
     <p:spTree>
       <p:nvGrpSpPr>
@@ -9192,7 +9149,7 @@
         </p:spPr>
         <p:txBody>
           <a:bodyPr>
-            <a:normAutofit fontScale="92500"/>
+            <a:normAutofit fontScale="92.5%"/>
           </a:bodyPr>
           <a:lstStyle/>
           <a:p>
@@ -9235,7 +9192,7 @@
 </file>
 
 <file path=ppt/slides/slide20.xml><?xml version="1.0" encoding="utf-8"?>
-<p:sld xmlns:a="http://schemas.openxmlformats.org/drawingml/2006/main" xmlns:r="http://schemas.openxmlformats.org/officeDocument/2006/relationships" xmlns:p="http://schemas.openxmlformats.org/presentationml/2006/main">
+<p:sld xmlns:a="http://purl.oclc.org/ooxml/drawingml/main" xmlns:r="http://purl.oclc.org/ooxml/officeDocument/relationships" xmlns:p="http://purl.oclc.org/ooxml/presentationml/main">
   <p:cSld>
     <p:spTree>
       <p:nvGrpSpPr>
@@ -9264,7 +9221,7 @@
         <p:spPr/>
         <p:txBody>
           <a:bodyPr>
-            <a:normAutofit fontScale="90000"/>
+            <a:normAutofit fontScale="90%"/>
           </a:bodyPr>
           <a:lstStyle/>
           <a:p>
@@ -9322,7 +9279,7 @@
                 <a:solidFill>
                   <a:schemeClr val="tx1"/>
                 </a:solidFill>
-                <a:miter lim="800000"/>
+                <a:miter lim="800%"/>
                 <a:headEnd/>
                 <a:tailEnd/>
               </a14:hiddenLine>
@@ -9351,7 +9308,7 @@
 </file>
 
 <file path=ppt/slides/slide21.xml><?xml version="1.0" encoding="utf-8"?>
-<p:sld xmlns:a="http://schemas.openxmlformats.org/drawingml/2006/main" xmlns:r="http://schemas.openxmlformats.org/officeDocument/2006/relationships" xmlns:p="http://schemas.openxmlformats.org/presentationml/2006/main">
+<p:sld xmlns:a="http://purl.oclc.org/ooxml/drawingml/main" xmlns:r="http://purl.oclc.org/ooxml/officeDocument/relationships" xmlns:p="http://purl.oclc.org/ooxml/presentationml/main">
   <p:cSld>
     <p:spTree>
       <p:nvGrpSpPr>
@@ -9413,7 +9370,7 @@
                 <a:solidFill>
                   <a:schemeClr val="tx1"/>
                 </a:solidFill>
-                <a:miter lim="800000"/>
+                <a:miter lim="800%"/>
                 <a:headEnd/>
                 <a:tailEnd/>
               </a14:hiddenLine>
@@ -9442,7 +9399,7 @@
 </file>
 
 <file path=ppt/slides/slide22.xml><?xml version="1.0" encoding="utf-8"?>
-<p:sld xmlns:a="http://schemas.openxmlformats.org/drawingml/2006/main" xmlns:r="http://schemas.openxmlformats.org/officeDocument/2006/relationships" xmlns:p="http://schemas.openxmlformats.org/presentationml/2006/main">
+<p:sld xmlns:a="http://purl.oclc.org/ooxml/drawingml/main" xmlns:r="http://purl.oclc.org/ooxml/officeDocument/relationships" xmlns:p="http://purl.oclc.org/ooxml/presentationml/main">
   <p:cSld>
     <p:spTree>
       <p:nvGrpSpPr>
@@ -9532,7 +9489,7 @@
                 <a:solidFill>
                   <a:schemeClr val="tx1"/>
                 </a:solidFill>
-                <a:miter lim="800000"/>
+                <a:miter lim="800%"/>
                 <a:headEnd/>
                 <a:tailEnd/>
               </a14:hiddenLine>
@@ -9561,7 +9518,7 @@
 </file>
 
 <file path=ppt/slides/slide23.xml><?xml version="1.0" encoding="utf-8"?>
-<p:sld xmlns:a="http://schemas.openxmlformats.org/drawingml/2006/main" xmlns:r="http://schemas.openxmlformats.org/officeDocument/2006/relationships" xmlns:p="http://schemas.openxmlformats.org/presentationml/2006/main">
+<p:sld xmlns:a="http://purl.oclc.org/ooxml/drawingml/main" xmlns:r="http://purl.oclc.org/ooxml/officeDocument/relationships" xmlns:p="http://purl.oclc.org/ooxml/presentationml/main">
   <p:cSld>
     <p:spTree>
       <p:nvGrpSpPr>
@@ -9594,15 +9551,7 @@
           <a:p>
             <a:r>
               <a:rPr lang="en-US" dirty="0" smtClean="0"/>
-              <a:t>Hmmm, w</a:t>
-            </a:r>
-            <a:r>
-              <a:rPr lang="en-US" dirty="0" smtClean="0"/>
-              <a:t>ho </a:t>
-            </a:r>
-            <a:r>
-              <a:rPr lang="en-US" dirty="0" smtClean="0"/>
-              <a:t>can see this?</a:t>
+              <a:t>Hmmm, who can see this?</a:t>
             </a:r>
             <a:endParaRPr lang="en-US" dirty="0"/>
           </a:p>
@@ -9783,7 +9732,7 @@
 </file>
 
 <file path=ppt/slides/slide24.xml><?xml version="1.0" encoding="utf-8"?>
-<p:sld xmlns:a="http://schemas.openxmlformats.org/drawingml/2006/main" xmlns:r="http://schemas.openxmlformats.org/officeDocument/2006/relationships" xmlns:p="http://schemas.openxmlformats.org/presentationml/2006/main">
+<p:sld xmlns:a="http://purl.oclc.org/ooxml/drawingml/main" xmlns:r="http://purl.oclc.org/ooxml/officeDocument/relationships" xmlns:p="http://purl.oclc.org/ooxml/presentationml/main">
   <p:cSld>
     <p:spTree>
       <p:nvGrpSpPr>
@@ -9817,7 +9766,7 @@
         </p:spPr>
         <p:txBody>
           <a:bodyPr>
-            <a:normAutofit fontScale="90000"/>
+            <a:normAutofit fontScale="90%"/>
           </a:bodyPr>
           <a:lstStyle/>
           <a:p>
@@ -9877,7 +9826,7 @@
                 <a:solidFill>
                   <a:schemeClr val="tx1"/>
                 </a:solidFill>
-                <a:miter lim="800000"/>
+                <a:miter lim="800%"/>
                 <a:headEnd/>
                 <a:tailEnd/>
               </a14:hiddenLine>
@@ -9931,7 +9880,7 @@
                 <a:solidFill>
                   <a:schemeClr val="tx1"/>
                 </a:solidFill>
-                <a:miter lim="800000"/>
+                <a:miter lim="800%"/>
                 <a:headEnd/>
                 <a:tailEnd/>
               </a14:hiddenLine>
@@ -10045,12 +9994,12 @@
                                         </p:attrNameLst>
                                       </p:cBhvr>
                                       <p:tavLst>
-                                        <p:tav tm="0">
+                                        <p:tav tm="0%">
                                           <p:val>
                                             <p:strVal val="#ppt_x"/>
                                           </p:val>
                                         </p:tav>
-                                        <p:tav tm="100000">
+                                        <p:tav tm="100%">
                                           <p:val>
                                             <p:strVal val="#ppt_x"/>
                                           </p:val>
@@ -10068,12 +10017,12 @@
                                         </p:attrNameLst>
                                       </p:cBhvr>
                                       <p:tavLst>
-                                        <p:tav tm="0">
+                                        <p:tav tm="0%">
                                           <p:val>
                                             <p:strVal val="1+#ppt_h/2"/>
                                           </p:val>
                                         </p:tav>
-                                        <p:tav tm="100000">
+                                        <p:tav tm="100%">
                                           <p:val>
                                             <p:strVal val="#ppt_y"/>
                                           </p:val>
@@ -10118,7 +10067,7 @@
 </file>
 
 <file path=ppt/slides/slide25.xml><?xml version="1.0" encoding="utf-8"?>
-<p:sld xmlns:a="http://schemas.openxmlformats.org/drawingml/2006/main" xmlns:r="http://schemas.openxmlformats.org/officeDocument/2006/relationships" xmlns:p="http://schemas.openxmlformats.org/presentationml/2006/main">
+<p:sld xmlns:a="http://purl.oclc.org/ooxml/drawingml/main" xmlns:r="http://purl.oclc.org/ooxml/officeDocument/relationships" xmlns:p="http://purl.oclc.org/ooxml/presentationml/main">
   <p:cSld>
     <p:spTree>
       <p:nvGrpSpPr>
@@ -10210,7 +10159,7 @@
 </file>
 
 <file path=ppt/slides/slide26.xml><?xml version="1.0" encoding="utf-8"?>
-<p:sld xmlns:a="http://schemas.openxmlformats.org/drawingml/2006/main" xmlns:r="http://schemas.openxmlformats.org/officeDocument/2006/relationships" xmlns:p="http://schemas.openxmlformats.org/presentationml/2006/main">
+<p:sld xmlns:a="http://purl.oclc.org/ooxml/drawingml/main" xmlns:r="http://purl.oclc.org/ooxml/officeDocument/relationships" xmlns:p="http://purl.oclc.org/ooxml/presentationml/main">
   <p:cSld>
     <p:spTree>
       <p:nvGrpSpPr>
@@ -10239,7 +10188,7 @@
         <p:spPr/>
         <p:txBody>
           <a:bodyPr>
-            <a:normAutofit fontScale="90000"/>
+            <a:normAutofit fontScale="90%"/>
           </a:bodyPr>
           <a:lstStyle/>
           <a:p>
@@ -10269,7 +10218,7 @@
         </p:spPr>
         <p:txBody>
           <a:bodyPr>
-            <a:normAutofit fontScale="77500" lnSpcReduction="20000"/>
+            <a:normAutofit fontScale="77.5%" lnSpcReduction="20%"/>
           </a:bodyPr>
           <a:lstStyle/>
           <a:p>
@@ -10305,54 +10254,20 @@
             </a:pPr>
             <a:r>
               <a:rPr lang="en-US" dirty="0" smtClean="0"/>
-              <a:t>Strategic approach is needed </a:t>
-            </a:r>
-            <a:r>
-              <a:rPr lang="en-US" dirty="0" smtClean="0"/>
-              <a:t>to </a:t>
-            </a:r>
-            <a:r>
-              <a:rPr lang="en-US" dirty="0" smtClean="0"/>
-              <a:t>explore </a:t>
-            </a:r>
-            <a:r>
-              <a:rPr lang="en-US" dirty="0" smtClean="0"/>
-              <a:t>all possibilities</a:t>
-            </a:r>
-            <a:endParaRPr lang="en-US" dirty="0" smtClean="0"/>
+              <a:t>Strategic approach is needed to explore all possibilities</a:t>
+            </a:r>
           </a:p>
           <a:p>
             <a:r>
               <a:rPr lang="en-US" i="1" dirty="0" smtClean="0"/>
-              <a:t>“How might </a:t>
-            </a:r>
+              <a:t>“How might any given area of modern naval operations change with addition of EMCON and NOW capabilities?”</a:t>
+            </a:r>
+          </a:p>
+          <a:p>
             <a:r>
               <a:rPr lang="en-US" i="1" dirty="0" smtClean="0"/>
-              <a:t>any </a:t>
-            </a:r>
-            <a:r>
-              <a:rPr lang="en-US" i="1" dirty="0" smtClean="0"/>
-              <a:t>given area of modern naval operations change with addition of </a:t>
-            </a:r>
-            <a:r>
-              <a:rPr lang="en-US" i="1" dirty="0" smtClean="0"/>
-              <a:t>EMCON and NOW </a:t>
-            </a:r>
-            <a:r>
-              <a:rPr lang="en-US" i="1" dirty="0" smtClean="0"/>
-              <a:t>capabilities?”</a:t>
-            </a:r>
-          </a:p>
-          <a:p>
-            <a:r>
-              <a:rPr lang="en-US" i="1" dirty="0" smtClean="0"/>
-              <a:t>“How can NOW serve as organizing basis for flotilla concept of operations (CONOPS) </a:t>
-            </a:r>
-            <a:r>
-              <a:rPr lang="en-US" i="1" dirty="0" smtClean="0"/>
-              <a:t>situated in littorals?”</a:t>
-            </a:r>
-            <a:endParaRPr lang="en-US" i="1" dirty="0" smtClean="0"/>
+              <a:t>“How can NOW serve as organizing basis for flotilla concept of operations (CONOPS) situated in littorals?”</a:t>
+            </a:r>
           </a:p>
           <a:p>
             <a:pPr marL="0" indent="0">
@@ -10372,11 +10287,7 @@
           <a:p>
             <a:r>
               <a:rPr lang="en-US" dirty="0" smtClean="0"/>
-              <a:t>Goal: a</a:t>
-            </a:r>
-            <a:r>
-              <a:rPr lang="en-US" dirty="0" smtClean="0"/>
-              <a:t>ll </a:t>
+              <a:t>Goal: all </a:t>
             </a:r>
             <a:r>
               <a:rPr lang="en-US" dirty="0"/>
@@ -10390,15 +10301,7 @@
           <a:p>
             <a:r>
               <a:rPr lang="en-US" dirty="0" smtClean="0"/>
-              <a:t>Perhaps a </a:t>
-            </a:r>
-            <a:r>
-              <a:rPr lang="en-US" dirty="0" smtClean="0"/>
-              <a:t>“constellation” of theses painting a bigger picture</a:t>
-            </a:r>
-            <a:r>
-              <a:rPr lang="en-US" dirty="0" smtClean="0"/>
-              <a:t>?</a:t>
+              <a:t>Perhaps a “constellation” of theses painting a bigger picture?</a:t>
             </a:r>
           </a:p>
           <a:p>
@@ -10406,7 +10309,6 @@
               <a:rPr lang="en-US" dirty="0" smtClean="0"/>
               <a:t>Current and open topic summaries follow</a:t>
             </a:r>
-            <a:endParaRPr lang="en-US" dirty="0" smtClean="0"/>
           </a:p>
           <a:p>
             <a:endParaRPr lang="en-US" dirty="0" smtClean="0"/>
@@ -10434,7 +10336,7 @@
 </file>
 
 <file path=ppt/slides/slide27.xml><?xml version="1.0" encoding="utf-8"?>
-<p:sld xmlns:a="http://schemas.openxmlformats.org/drawingml/2006/main" xmlns:r="http://schemas.openxmlformats.org/officeDocument/2006/relationships" xmlns:p="http://schemas.openxmlformats.org/presentationml/2006/main">
+<p:sld xmlns:a="http://purl.oclc.org/ooxml/drawingml/main" xmlns:r="http://purl.oclc.org/ooxml/officeDocument/relationships" xmlns:p="http://purl.oclc.org/ooxml/presentationml/main">
   <p:cSld>
     <p:spTree>
       <p:nvGrpSpPr>
@@ -10500,7 +10402,7 @@
         </p:spPr>
         <p:txBody>
           <a:bodyPr>
-            <a:normAutofit fontScale="77500" lnSpcReduction="20000"/>
+            <a:normAutofit fontScale="77.5%" lnSpcReduction="20%"/>
           </a:bodyPr>
           <a:lstStyle/>
           <a:p>
@@ -10603,21 +10505,8 @@
           <a:p>
             <a:r>
               <a:rPr lang="en-US" dirty="0" smtClean="0"/>
-              <a:t>2 theses complete, </a:t>
-            </a:r>
-            <a:r>
-              <a:rPr lang="en-US" dirty="0" smtClean="0"/>
-              <a:t>work on 2 </a:t>
-            </a:r>
-            <a:r>
-              <a:rPr lang="en-US" dirty="0" smtClean="0"/>
-              <a:t>more </a:t>
-            </a:r>
-            <a:r>
-              <a:rPr lang="en-US" dirty="0" smtClean="0"/>
-              <a:t>has commenced</a:t>
-            </a:r>
-            <a:endParaRPr lang="en-US" dirty="0" smtClean="0"/>
+              <a:t>2 theses complete, work on 2 more has commenced</a:t>
+            </a:r>
           </a:p>
           <a:p>
             <a:endParaRPr lang="en-US" dirty="0"/>
@@ -10764,7 +10653,7 @@
 </file>
 
 <file path=ppt/slides/slide28.xml><?xml version="1.0" encoding="utf-8"?>
-<p:sld xmlns:a="http://schemas.openxmlformats.org/drawingml/2006/main" xmlns:r="http://schemas.openxmlformats.org/officeDocument/2006/relationships" xmlns:p="http://schemas.openxmlformats.org/presentationml/2006/main">
+<p:sld xmlns:a="http://purl.oclc.org/ooxml/drawingml/main" xmlns:r="http://purl.oclc.org/ooxml/officeDocument/relationships" xmlns:p="http://purl.oclc.org/ooxml/presentationml/main">
   <p:cSld>
     <p:spTree>
       <p:nvGrpSpPr>
@@ -10793,7 +10682,7 @@
         <p:spPr/>
         <p:txBody>
           <a:bodyPr>
-            <a:normAutofit fontScale="90000"/>
+            <a:normAutofit fontScale="90%"/>
           </a:bodyPr>
           <a:lstStyle/>
           <a:p>
@@ -10823,7 +10712,7 @@
         </p:spPr>
         <p:txBody>
           <a:bodyPr>
-            <a:normAutofit fontScale="85000" lnSpcReduction="20000"/>
+            <a:normAutofit fontScale="85%" lnSpcReduction="20%"/>
           </a:bodyPr>
           <a:lstStyle/>
           <a:p>
@@ -10873,55 +10762,19 @@
             </a:pPr>
             <a:r>
               <a:rPr lang="en-US" dirty="0" smtClean="0"/>
-              <a:t>Lots of well-defined work </a:t>
-            </a:r>
-            <a:r>
-              <a:rPr lang="en-US" dirty="0" smtClean="0"/>
-              <a:t>to </a:t>
-            </a:r>
-            <a:r>
-              <a:rPr lang="en-US" dirty="0" smtClean="0"/>
-              <a:t>implement and evaluate:</a:t>
-            </a:r>
-          </a:p>
-          <a:p>
-            <a:r>
-              <a:rPr lang="en-US" dirty="0" smtClean="0"/>
-              <a:t>Digital Flashing Light (DFL) </a:t>
-            </a:r>
-            <a:r>
-              <a:rPr lang="en-US" dirty="0" smtClean="0"/>
-              <a:t>requirements are </a:t>
-            </a:r>
-            <a:r>
-              <a:rPr lang="en-US" dirty="0" smtClean="0"/>
-              <a:t>subset </a:t>
-            </a:r>
-            <a:r>
-              <a:rPr lang="en-US" dirty="0" smtClean="0"/>
-              <a:t>of QR</a:t>
-            </a:r>
-          </a:p>
-          <a:p>
-            <a:r>
-              <a:rPr lang="en-US" dirty="0" smtClean="0"/>
-              <a:t>Define </a:t>
-            </a:r>
-            <a:r>
-              <a:rPr lang="en-US" dirty="0" smtClean="0"/>
-              <a:t>RFCs </a:t>
-            </a:r>
-            <a:r>
-              <a:rPr lang="en-US" dirty="0" smtClean="0"/>
-              <a:t>for Internet Protocol (IP) over </a:t>
-            </a:r>
-            <a:r>
-              <a:rPr lang="en-US" dirty="0" smtClean="0"/>
-              <a:t>QR and </a:t>
-            </a:r>
-            <a:r>
-              <a:rPr lang="en-US" dirty="0" smtClean="0"/>
-              <a:t>DFL</a:t>
+              <a:t>Lots of well-defined work to implement and evaluate:</a:t>
+            </a:r>
+          </a:p>
+          <a:p>
+            <a:r>
+              <a:rPr lang="en-US" dirty="0" smtClean="0"/>
+              <a:t>Digital Flashing Light (DFL) requirements are subset of QR</a:t>
+            </a:r>
+          </a:p>
+          <a:p>
+            <a:r>
+              <a:rPr lang="en-US" dirty="0" smtClean="0"/>
+              <a:t>Define RFCs for Internet Protocol (IP) over QR and DFL</a:t>
             </a:r>
           </a:p>
           <a:p>
@@ -10982,7 +10835,7 @@
 </file>
 
 <file path=ppt/slides/slide29.xml><?xml version="1.0" encoding="utf-8"?>
-<p:sld xmlns:a="http://schemas.openxmlformats.org/drawingml/2006/main" xmlns:r="http://schemas.openxmlformats.org/officeDocument/2006/relationships" xmlns:p="http://schemas.openxmlformats.org/presentationml/2006/main">
+<p:sld xmlns:a="http://purl.oclc.org/ooxml/drawingml/main" xmlns:r="http://purl.oclc.org/ooxml/officeDocument/relationships" xmlns:p="http://purl.oclc.org/ooxml/presentationml/main">
   <p:cSld>
     <p:spTree>
       <p:nvGrpSpPr>
@@ -11034,7 +10887,7 @@
         <p:spPr/>
         <p:txBody>
           <a:bodyPr>
-            <a:normAutofit fontScale="92500" lnSpcReduction="10000"/>
+            <a:normAutofit fontScale="92.5%" lnSpcReduction="10%"/>
           </a:bodyPr>
           <a:lstStyle/>
           <a:p>
@@ -11118,7 +10971,7 @@
 </file>
 
 <file path=ppt/slides/slide3.xml><?xml version="1.0" encoding="utf-8"?>
-<p:sld xmlns:a="http://schemas.openxmlformats.org/drawingml/2006/main" xmlns:r="http://schemas.openxmlformats.org/officeDocument/2006/relationships" xmlns:p="http://schemas.openxmlformats.org/presentationml/2006/main">
+<p:sld xmlns:a="http://purl.oclc.org/ooxml/drawingml/main" xmlns:r="http://purl.oclc.org/ooxml/officeDocument/relationships" xmlns:p="http://purl.oclc.org/ooxml/presentationml/main">
   <p:cSld>
     <p:spTree>
       <p:nvGrpSpPr>
@@ -11175,7 +11028,7 @@
         </p:spPr>
         <p:txBody>
           <a:bodyPr>
-            <a:normAutofit lnSpcReduction="10000"/>
+            <a:normAutofit lnSpcReduction="10%"/>
           </a:bodyPr>
           <a:lstStyle/>
           <a:p>
@@ -11297,7 +11150,7 @@
 </file>
 
 <file path=ppt/slides/slide30.xml><?xml version="1.0" encoding="utf-8"?>
-<p:sld xmlns:a="http://schemas.openxmlformats.org/drawingml/2006/main" xmlns:r="http://schemas.openxmlformats.org/officeDocument/2006/relationships" xmlns:p="http://schemas.openxmlformats.org/presentationml/2006/main">
+<p:sld xmlns:a="http://purl.oclc.org/ooxml/drawingml/main" xmlns:r="http://purl.oclc.org/ooxml/officeDocument/relationships" xmlns:p="http://purl.oclc.org/ooxml/presentationml/main">
   <p:cSld>
     <p:spTree>
       <p:nvGrpSpPr>
@@ -11372,7 +11225,7 @@
             <a:solidFill>
               <a:schemeClr val="tx1"/>
             </a:solidFill>
-            <a:miter lim="800000"/>
+            <a:miter lim="800%"/>
             <a:headEnd/>
             <a:tailEnd/>
           </a:ln>
@@ -11425,7 +11278,7 @@
           <p:style>
             <a:lnRef idx="2">
               <a:schemeClr val="accent1">
-                <a:shade val="50000"/>
+                <a:shade val="50%"/>
               </a:schemeClr>
             </a:lnRef>
             <a:fillRef idx="1">
@@ -11557,12 +11410,12 @@
                                         </p:attrNameLst>
                                       </p:cBhvr>
                                       <p:tavLst>
-                                        <p:tav tm="0">
+                                        <p:tav tm="0%">
                                           <p:val>
                                             <p:strVal val="1+#ppt_w/2"/>
                                           </p:val>
                                         </p:tav>
-                                        <p:tav tm="100000">
+                                        <p:tav tm="100%">
                                           <p:val>
                                             <p:strVal val="#ppt_x"/>
                                           </p:val>
@@ -11580,12 +11433,12 @@
                                         </p:attrNameLst>
                                       </p:cBhvr>
                                       <p:tavLst>
-                                        <p:tav tm="0">
+                                        <p:tav tm="0%">
                                           <p:val>
                                             <p:strVal val="#ppt_y"/>
                                           </p:val>
                                         </p:tav>
-                                        <p:tav tm="100000">
+                                        <p:tav tm="100%">
                                           <p:val>
                                             <p:strVal val="#ppt_y"/>
                                           </p:val>
@@ -11627,7 +11480,7 @@
 </file>
 
 <file path=ppt/slides/slide31.xml><?xml version="1.0" encoding="utf-8"?>
-<p:sld xmlns:a="http://schemas.openxmlformats.org/drawingml/2006/main" xmlns:r="http://schemas.openxmlformats.org/officeDocument/2006/relationships" xmlns:p="http://schemas.openxmlformats.org/presentationml/2006/main">
+<p:sld xmlns:a="http://purl.oclc.org/ooxml/drawingml/main" xmlns:r="http://purl.oclc.org/ooxml/officeDocument/relationships" xmlns:p="http://purl.oclc.org/ooxml/presentationml/main">
   <p:cSld>
     <p:spTree>
       <p:nvGrpSpPr>
@@ -11684,7 +11537,7 @@
         <p:spPr/>
         <p:txBody>
           <a:bodyPr>
-            <a:normAutofit lnSpcReduction="10000"/>
+            <a:normAutofit lnSpcReduction="10%"/>
           </a:bodyPr>
           <a:lstStyle/>
           <a:p>
@@ -11808,7 +11661,7 @@
 </file>
 
 <file path=ppt/slides/slide32.xml><?xml version="1.0" encoding="utf-8"?>
-<p:sld xmlns:a="http://schemas.openxmlformats.org/drawingml/2006/main" xmlns:r="http://schemas.openxmlformats.org/officeDocument/2006/relationships" xmlns:p="http://schemas.openxmlformats.org/presentationml/2006/main">
+<p:sld xmlns:a="http://purl.oclc.org/ooxml/drawingml/main" xmlns:r="http://purl.oclc.org/ooxml/officeDocument/relationships" xmlns:p="http://purl.oclc.org/ooxml/presentationml/main">
   <p:cSld>
     <p:spTree>
       <p:nvGrpSpPr>
@@ -11865,7 +11718,7 @@
         </p:spPr>
         <p:txBody>
           <a:bodyPr>
-            <a:normAutofit fontScale="92500" lnSpcReduction="10000"/>
+            <a:normAutofit fontScale="92.5%" lnSpcReduction="10%"/>
           </a:bodyPr>
           <a:lstStyle/>
           <a:p>
@@ -11898,19 +11751,7 @@
           <a:p>
             <a:r>
               <a:rPr lang="en-US" dirty="0" smtClean="0"/>
-              <a:t>Can relay blimps </a:t>
-            </a:r>
-            <a:r>
-              <a:rPr lang="en-US" dirty="0" smtClean="0"/>
-              <a:t>receive covertly, </a:t>
-            </a:r>
-            <a:r>
-              <a:rPr lang="en-US" dirty="0" smtClean="0"/>
-              <a:t>without </a:t>
-            </a:r>
-            <a:r>
-              <a:rPr lang="en-US" dirty="0" smtClean="0"/>
-              <a:t>reflecting or revealing data transfer?</a:t>
+              <a:t>Can relay blimps receive covertly, without reflecting or revealing data transfer?</a:t>
             </a:r>
           </a:p>
           <a:p>
@@ -11918,7 +11759,6 @@
               <a:rPr lang="en-US" dirty="0" smtClean="0"/>
               <a:t>Does other work examine protections, precautions?</a:t>
             </a:r>
-            <a:endParaRPr lang="en-US" dirty="0" smtClean="0"/>
           </a:p>
         </p:txBody>
       </p:sp>
@@ -11943,7 +11783,7 @@
 </file>
 
 <file path=ppt/slides/slide33.xml><?xml version="1.0" encoding="utf-8"?>
-<p:sld xmlns:a="http://schemas.openxmlformats.org/drawingml/2006/main" xmlns:r="http://schemas.openxmlformats.org/officeDocument/2006/relationships" xmlns:p="http://schemas.openxmlformats.org/presentationml/2006/main">
+<p:sld xmlns:a="http://purl.oclc.org/ooxml/drawingml/main" xmlns:r="http://purl.oclc.org/ooxml/officeDocument/relationships" xmlns:p="http://purl.oclc.org/ooxml/presentationml/main">
   <p:cSld>
     <p:spTree>
       <p:nvGrpSpPr>
@@ -12000,7 +11840,7 @@
         </p:spPr>
         <p:txBody>
           <a:bodyPr>
-            <a:normAutofit fontScale="92500" lnSpcReduction="20000"/>
+            <a:normAutofit fontScale="92.5%" lnSpcReduction="20%"/>
           </a:bodyPr>
           <a:lstStyle/>
           <a:p>
@@ -12015,21 +11855,8 @@
           <a:p>
             <a:r>
               <a:rPr lang="en-US" dirty="0" smtClean="0"/>
-              <a:t>Wave </a:t>
-            </a:r>
-            <a:r>
-              <a:rPr lang="en-US" dirty="0" smtClean="0"/>
-              <a:t>a tablet-computer </a:t>
-            </a:r>
-            <a:r>
-              <a:rPr lang="en-US" dirty="0" smtClean="0"/>
-              <a:t>camera from horizon to </a:t>
-            </a:r>
-            <a:r>
-              <a:rPr lang="en-US" dirty="0" smtClean="0"/>
-              <a:t>zenith for large section of night sky</a:t>
-            </a:r>
-            <a:endParaRPr lang="en-US" dirty="0" smtClean="0"/>
+              <a:t>Wave a tablet-computer camera from horizon to zenith for large section of night sky</a:t>
+            </a:r>
           </a:p>
           <a:p>
             <a:r>
@@ -12040,17 +11867,8 @@
           <a:p>
             <a:r>
               <a:rPr lang="en-US" dirty="0" smtClean="0"/>
-              <a:t>Needs precise </a:t>
-            </a:r>
-            <a:r>
-              <a:rPr lang="en-US" dirty="0" smtClean="0"/>
-              <a:t>time </a:t>
-            </a:r>
-            <a:r>
-              <a:rPr lang="en-US" dirty="0" smtClean="0"/>
-              <a:t>mark, computational capability</a:t>
-            </a:r>
-            <a:endParaRPr lang="en-US" dirty="0" smtClean="0"/>
+              <a:t>Needs precise time mark, computational capability</a:t>
+            </a:r>
           </a:p>
           <a:p>
             <a:r>
@@ -12070,33 +11888,13 @@
             </a:pPr>
             <a:r>
               <a:rPr lang="en-US" dirty="0" smtClean="0"/>
-              <a:t>Insight</a:t>
-            </a:r>
-            <a:r>
-              <a:rPr lang="en-US" dirty="0" smtClean="0"/>
-              <a:t>: isn’t this equivalent to sextant readings?</a:t>
-            </a:r>
-          </a:p>
-          <a:p>
-            <a:r>
-              <a:rPr lang="en-US" dirty="0" smtClean="0"/>
-              <a:t>If so, can get navigational fix without </a:t>
-            </a:r>
-            <a:r>
-              <a:rPr lang="en-US" dirty="0" smtClean="0"/>
-              <a:t>needing GPS </a:t>
-            </a:r>
-            <a:r>
-              <a:rPr lang="en-US" dirty="0" smtClean="0"/>
-              <a:t>or </a:t>
-            </a:r>
-            <a:r>
-              <a:rPr lang="en-US" dirty="0" smtClean="0"/>
-              <a:t>any special </a:t>
-            </a:r>
-            <a:r>
-              <a:rPr lang="en-US" dirty="0" smtClean="0"/>
-              <a:t>equipment</a:t>
+              <a:t>Insight: isn’t this equivalent to sextant readings?</a:t>
+            </a:r>
+          </a:p>
+          <a:p>
+            <a:r>
+              <a:rPr lang="en-US" dirty="0" smtClean="0"/>
+              <a:t>If so, can get navigational fix without needing GPS or any special equipment</a:t>
             </a:r>
           </a:p>
           <a:p>
@@ -12131,7 +11929,7 @@
 </file>
 
 <file path=ppt/slides/slide34.xml><?xml version="1.0" encoding="utf-8"?>
-<p:sld xmlns:a="http://schemas.openxmlformats.org/drawingml/2006/main" xmlns:r="http://schemas.openxmlformats.org/officeDocument/2006/relationships" xmlns:p="http://schemas.openxmlformats.org/presentationml/2006/main">
+<p:sld xmlns:a="http://purl.oclc.org/ooxml/drawingml/main" xmlns:r="http://purl.oclc.org/ooxml/officeDocument/relationships" xmlns:p="http://purl.oclc.org/ooxml/presentationml/main">
   <p:cSld>
     <p:spTree>
       <p:nvGrpSpPr>
@@ -12188,7 +11986,7 @@
         </p:spPr>
         <p:txBody>
           <a:bodyPr>
-            <a:normAutofit fontScale="92500" lnSpcReduction="20000"/>
+            <a:normAutofit fontScale="92.5%" lnSpcReduction="20%"/>
           </a:bodyPr>
           <a:lstStyle/>
           <a:p>
@@ -12308,7 +12106,7 @@
 </file>
 
 <file path=ppt/slides/slide35.xml><?xml version="1.0" encoding="utf-8"?>
-<p:sld xmlns:a="http://schemas.openxmlformats.org/drawingml/2006/main" xmlns:r="http://schemas.openxmlformats.org/officeDocument/2006/relationships" xmlns:p="http://schemas.openxmlformats.org/presentationml/2006/main">
+<p:sld xmlns:a="http://purl.oclc.org/ooxml/drawingml/main" xmlns:r="http://purl.oclc.org/ooxml/officeDocument/relationships" xmlns:p="http://purl.oclc.org/ooxml/presentationml/main">
   <p:cSld>
     <p:spTree>
       <p:nvGrpSpPr>
@@ -12417,7 +12215,7 @@
 </file>
 
 <file path=ppt/slides/slide36.xml><?xml version="1.0" encoding="utf-8"?>
-<p:sld xmlns:a="http://schemas.openxmlformats.org/drawingml/2006/main" xmlns:r="http://schemas.openxmlformats.org/officeDocument/2006/relationships" xmlns:p="http://schemas.openxmlformats.org/presentationml/2006/main">
+<p:sld xmlns:a="http://purl.oclc.org/ooxml/drawingml/main" xmlns:r="http://purl.oclc.org/ooxml/officeDocument/relationships" xmlns:p="http://purl.oclc.org/ooxml/presentationml/main">
   <p:cSld>
     <p:spTree>
       <p:nvGrpSpPr>
@@ -12446,7 +12244,7 @@
         <p:spPr/>
         <p:txBody>
           <a:bodyPr>
-            <a:normAutofit fontScale="90000"/>
+            <a:normAutofit fontScale="90%"/>
           </a:bodyPr>
           <a:lstStyle/>
           <a:p>
@@ -12476,7 +12274,7 @@
         </p:spPr>
         <p:txBody>
           <a:bodyPr>
-            <a:normAutofit fontScale="85000" lnSpcReduction="10000"/>
+            <a:normAutofit fontScale="85%" lnSpcReduction="10%"/>
           </a:bodyPr>
           <a:lstStyle/>
           <a:p>
@@ -12485,19 +12283,7 @@
             </a:pPr>
             <a:r>
               <a:rPr lang="en-US" dirty="0" smtClean="0"/>
-              <a:t>Flotilla </a:t>
-            </a:r>
-            <a:r>
-              <a:rPr lang="en-US" dirty="0" smtClean="0"/>
-              <a:t>operations using unmanned systems </a:t>
-            </a:r>
-            <a:r>
-              <a:rPr lang="en-US" dirty="0" smtClean="0"/>
-              <a:t>lead to a </a:t>
-            </a:r>
-            <a:r>
-              <a:rPr lang="en-US" dirty="0" smtClean="0"/>
-              <a:t>logistics </a:t>
+              <a:t>Flotilla operations using unmanned systems lead to a logistics </a:t>
             </a:r>
             <a:r>
               <a:rPr lang="en-US" dirty="0"/>
@@ -12505,31 +12291,14 @@
             </a:r>
             <a:r>
               <a:rPr lang="en-US" dirty="0" smtClean="0"/>
-              <a:t>for a completely </a:t>
-            </a:r>
-            <a:r>
-              <a:rPr lang="en-US" dirty="0" smtClean="0"/>
-              <a:t>different order of </a:t>
-            </a:r>
-            <a:r>
-              <a:rPr lang="en-US" dirty="0" smtClean="0"/>
-              <a:t>battle</a:t>
-            </a:r>
-          </a:p>
-          <a:p>
-            <a:r>
-              <a:rPr lang="en-US" dirty="0" smtClean="0"/>
-              <a:t>Tenet </a:t>
-            </a:r>
-            <a:r>
-              <a:rPr lang="en-US" dirty="0" smtClean="0"/>
-              <a:t>remains “fire effectively first” </a:t>
-            </a:r>
-            <a:r>
-              <a:rPr lang="en-US" dirty="0" smtClean="0"/>
-              <a:t>once hostilities start</a:t>
-            </a:r>
-            <a:endParaRPr lang="en-US" dirty="0" smtClean="0"/>
+              <a:t>for a completely different order of battle</a:t>
+            </a:r>
+          </a:p>
+          <a:p>
+            <a:r>
+              <a:rPr lang="en-US" dirty="0" smtClean="0"/>
+              <a:t>Tenet remains “fire effectively first” once hostilities start</a:t>
+            </a:r>
           </a:p>
           <a:p>
             <a:pPr marL="0" indent="0">
@@ -12537,27 +12306,7 @@
             </a:pPr>
             <a:r>
               <a:rPr lang="en-US" dirty="0" smtClean="0"/>
-              <a:t>Logistics chain </a:t>
-            </a:r>
-            <a:r>
-              <a:rPr lang="en-US" dirty="0" smtClean="0"/>
-              <a:t>become</a:t>
-            </a:r>
-            <a:r>
-              <a:rPr lang="en-US" dirty="0" smtClean="0"/>
-              <a:t>s skinnier </a:t>
-            </a:r>
-            <a:r>
-              <a:rPr lang="en-US" dirty="0" smtClean="0"/>
-              <a:t>but </a:t>
-            </a:r>
-            <a:r>
-              <a:rPr lang="en-US" dirty="0" smtClean="0"/>
-              <a:t>also longer and </a:t>
-            </a:r>
-            <a:r>
-              <a:rPr lang="en-US" dirty="0" smtClean="0"/>
-              <a:t>wider</a:t>
+              <a:t>Logistics chain becomes skinnier but also longer and wider</a:t>
             </a:r>
           </a:p>
           <a:p>
@@ -12569,42 +12318,13 @@
           <a:p>
             <a:r>
               <a:rPr lang="en-US" dirty="0" smtClean="0"/>
-              <a:t>NOW reduces </a:t>
-            </a:r>
-            <a:r>
-              <a:rPr lang="en-US" dirty="0" smtClean="0"/>
-              <a:t>power </a:t>
-            </a:r>
-            <a:r>
-              <a:rPr lang="en-US" dirty="0" smtClean="0"/>
-              <a:t>consumption, improves endurance</a:t>
-            </a:r>
-            <a:endParaRPr lang="en-US" dirty="0" smtClean="0"/>
-          </a:p>
-          <a:p>
-            <a:r>
-              <a:rPr lang="en-US" dirty="0" smtClean="0"/>
-              <a:t>On-board additive </a:t>
-            </a:r>
-            <a:r>
-              <a:rPr lang="en-US" dirty="0" smtClean="0"/>
-              <a:t>manufacturing (aka “3D printing”) </a:t>
-            </a:r>
-            <a:r>
-              <a:rPr lang="en-US" dirty="0" smtClean="0"/>
-              <a:t>and UAV </a:t>
-            </a:r>
-            <a:r>
-              <a:rPr lang="en-US" dirty="0" smtClean="0"/>
-              <a:t>delivery </a:t>
-            </a:r>
-            <a:r>
-              <a:rPr lang="en-US" dirty="0" smtClean="0"/>
-              <a:t>will offer </a:t>
-            </a:r>
-            <a:r>
-              <a:rPr lang="en-US" dirty="0" smtClean="0"/>
-              <a:t>significant resupply options</a:t>
+              <a:t>NOW reduces power consumption, improves endurance</a:t>
+            </a:r>
+          </a:p>
+          <a:p>
+            <a:r>
+              <a:rPr lang="en-US" dirty="0" smtClean="0"/>
+              <a:t>On-board additive manufacturing (aka “3D printing”) and UAV delivery will offer significant resupply options</a:t>
             </a:r>
           </a:p>
           <a:p>
@@ -12616,26 +12336,13 @@
           <a:p>
             <a:r>
               <a:rPr lang="en-US" dirty="0" smtClean="0"/>
-              <a:t>Acquisition changes also likely:  for example, do we need different </a:t>
-            </a:r>
-            <a:r>
-              <a:rPr lang="en-US" dirty="0" smtClean="0"/>
-              <a:t>electro-optical sensors and </a:t>
-            </a:r>
-            <a:r>
-              <a:rPr lang="en-US" dirty="0" smtClean="0"/>
-              <a:t>signaling designs?</a:t>
-            </a:r>
-            <a:endParaRPr lang="en-US" dirty="0" smtClean="0"/>
-          </a:p>
-          <a:p>
-            <a:r>
-              <a:rPr lang="en-US" dirty="0" smtClean="0"/>
-              <a:t>Broad investigation </a:t>
-            </a:r>
-            <a:r>
-              <a:rPr lang="en-US" dirty="0" smtClean="0"/>
-              <a:t>and analysis needed</a:t>
+              <a:t>Acquisition changes also likely:  for example, do we need different electro-optical sensors and signaling designs?</a:t>
+            </a:r>
+          </a:p>
+          <a:p>
+            <a:r>
+              <a:rPr lang="en-US" dirty="0" smtClean="0"/>
+              <a:t>Broad investigation and analysis needed</a:t>
             </a:r>
             <a:endParaRPr lang="en-US" dirty="0"/>
           </a:p>
@@ -12662,7 +12369,7 @@
 </file>
 
 <file path=ppt/slides/slide37.xml><?xml version="1.0" encoding="utf-8"?>
-<p:sld xmlns:a="http://schemas.openxmlformats.org/drawingml/2006/main" xmlns:r="http://schemas.openxmlformats.org/officeDocument/2006/relationships" xmlns:p="http://schemas.openxmlformats.org/presentationml/2006/main">
+<p:sld xmlns:a="http://purl.oclc.org/ooxml/drawingml/main" xmlns:r="http://purl.oclc.org/ooxml/officeDocument/relationships" xmlns:p="http://purl.oclc.org/ooxml/presentationml/main">
   <p:cSld>
     <p:spTree>
       <p:nvGrpSpPr>
@@ -12745,7 +12452,7 @@
 </file>
 
 <file path=ppt/slides/slide38.xml><?xml version="1.0" encoding="utf-8"?>
-<p:sld xmlns:a="http://schemas.openxmlformats.org/drawingml/2006/main" xmlns:r="http://schemas.openxmlformats.org/officeDocument/2006/relationships" xmlns:p="http://schemas.openxmlformats.org/presentationml/2006/main">
+<p:sld xmlns:a="http://purl.oclc.org/ooxml/drawingml/main" xmlns:r="http://purl.oclc.org/ooxml/officeDocument/relationships" xmlns:p="http://purl.oclc.org/ooxml/presentationml/main">
   <p:cSld>
     <p:spTree>
       <p:nvGrpSpPr>
@@ -12802,7 +12509,7 @@
         </p:spPr>
         <p:txBody>
           <a:bodyPr>
-            <a:normAutofit fontScale="85000" lnSpcReduction="10000"/>
+            <a:normAutofit fontScale="85%" lnSpcReduction="10%"/>
           </a:bodyPr>
           <a:lstStyle/>
           <a:p>
@@ -12884,11 +12591,7 @@
           <a:p>
             <a:r>
               <a:rPr lang="en-US" dirty="0" smtClean="0"/>
-              <a:t>Reactions and insights are always welcome</a:t>
-            </a:r>
-            <a:r>
-              <a:rPr lang="en-US" dirty="0" smtClean="0"/>
-              <a:t>!</a:t>
+              <a:t>Reactions and insights are always welcome!</a:t>
             </a:r>
           </a:p>
           <a:p>
@@ -12896,7 +12599,6 @@
               <a:rPr lang="en-US" dirty="0" smtClean="0"/>
               <a:t>Thanks for all contributions and comments received</a:t>
             </a:r>
-            <a:endParaRPr lang="en-US" dirty="0" smtClean="0"/>
           </a:p>
           <a:p>
             <a:endParaRPr lang="en-US" dirty="0"/>
@@ -12924,7 +12626,7 @@
 </file>
 
 <file path=ppt/slides/slide39.xml><?xml version="1.0" encoding="utf-8"?>
-<p:sld xmlns:a="http://schemas.openxmlformats.org/drawingml/2006/main" xmlns:r="http://schemas.openxmlformats.org/officeDocument/2006/relationships" xmlns:p="http://schemas.openxmlformats.org/presentationml/2006/main">
+<p:sld xmlns:a="http://purl.oclc.org/ooxml/drawingml/main" xmlns:r="http://purl.oclc.org/ooxml/officeDocument/relationships" xmlns:p="http://purl.oclc.org/ooxml/presentationml/main">
   <p:cSld>
     <p:spTree>
       <p:nvGrpSpPr>
@@ -13033,7 +12735,7 @@
 </file>
 
 <file path=ppt/slides/slide4.xml><?xml version="1.0" encoding="utf-8"?>
-<p:sld xmlns:a="http://schemas.openxmlformats.org/drawingml/2006/main" xmlns:r="http://schemas.openxmlformats.org/officeDocument/2006/relationships" xmlns:p="http://schemas.openxmlformats.org/presentationml/2006/main">
+<p:sld xmlns:a="http://purl.oclc.org/ooxml/drawingml/main" xmlns:r="http://purl.oclc.org/ooxml/officeDocument/relationships" xmlns:p="http://purl.oclc.org/ooxml/presentationml/main">
   <p:cSld>
     <p:spTree>
       <p:nvGrpSpPr>
@@ -13090,7 +12792,7 @@
         </p:spPr>
         <p:txBody>
           <a:bodyPr>
-            <a:normAutofit fontScale="92500"/>
+            <a:normAutofit fontScale="92.5%"/>
           </a:bodyPr>
           <a:lstStyle/>
           <a:p>
@@ -13201,7 +12903,7 @@
 </file>
 
 <file path=ppt/slides/slide40.xml><?xml version="1.0" encoding="utf-8"?>
-<p:sld xmlns:a="http://schemas.openxmlformats.org/drawingml/2006/main" xmlns:r="http://schemas.openxmlformats.org/officeDocument/2006/relationships" xmlns:p="http://schemas.openxmlformats.org/presentationml/2006/main">
+<p:sld xmlns:a="http://purl.oclc.org/ooxml/drawingml/main" xmlns:r="http://purl.oclc.org/ooxml/officeDocument/relationships" xmlns:p="http://purl.oclc.org/ooxml/presentationml/main">
   <p:cSld>
     <p:spTree>
       <p:nvGrpSpPr>
@@ -13235,13 +12937,13 @@
         </p:spPr>
         <p:txBody>
           <a:bodyPr>
-            <a:normAutofit lnSpcReduction="10000"/>
+            <a:normAutofit lnSpcReduction="10%"/>
           </a:bodyPr>
           <a:lstStyle/>
           <a:p>
             <a:pPr marL="0" indent="0" algn="ctr">
               <a:lnSpc>
-                <a:spcPct val="10000"/>
+                <a:spcPct val="10%"/>
               </a:lnSpc>
             </a:pPr>
             <a:endParaRPr lang="en-US" dirty="0"/>
@@ -13249,7 +12951,7 @@
           <a:p>
             <a:pPr marL="0" indent="0" algn="ctr">
               <a:lnSpc>
-                <a:spcPct val="80000"/>
+                <a:spcPct val="80%"/>
               </a:lnSpc>
               <a:buNone/>
             </a:pPr>
@@ -13258,7 +12960,7 @@
           <a:p>
             <a:pPr marL="0" indent="0" algn="ctr">
               <a:lnSpc>
-                <a:spcPct val="80000"/>
+                <a:spcPct val="80%"/>
               </a:lnSpc>
               <a:buNone/>
             </a:pPr>
@@ -13275,7 +12977,7 @@
           <a:p>
             <a:pPr marL="0" indent="0" algn="ctr">
               <a:lnSpc>
-                <a:spcPct val="10000"/>
+                <a:spcPct val="10%"/>
               </a:lnSpc>
               <a:buNone/>
             </a:pPr>
@@ -13284,7 +12986,7 @@
           <a:p>
             <a:pPr marL="0" indent="0" algn="ctr">
               <a:lnSpc>
-                <a:spcPct val="10000"/>
+                <a:spcPct val="10%"/>
               </a:lnSpc>
               <a:buNone/>
             </a:pPr>
@@ -13293,7 +12995,7 @@
           <a:p>
             <a:pPr marL="0" indent="0" algn="ctr">
               <a:lnSpc>
-                <a:spcPct val="10000"/>
+                <a:spcPct val="10%"/>
               </a:lnSpc>
               <a:buNone/>
             </a:pPr>
@@ -13304,7 +13006,7 @@
           <a:p>
             <a:pPr marL="0" indent="0" algn="ctr">
               <a:lnSpc>
-                <a:spcPct val="10000"/>
+                <a:spcPct val="10%"/>
               </a:lnSpc>
               <a:buNone/>
             </a:pPr>
@@ -13315,7 +13017,7 @@
           <a:p>
             <a:pPr marL="0" indent="0" algn="ctr">
               <a:lnSpc>
-                <a:spcPct val="10000"/>
+                <a:spcPct val="10%"/>
               </a:lnSpc>
               <a:buNone/>
             </a:pPr>
@@ -13326,7 +13028,7 @@
           <a:p>
             <a:pPr marL="0" indent="0" algn="ctr">
               <a:lnSpc>
-                <a:spcPct val="10000"/>
+                <a:spcPct val="10%"/>
               </a:lnSpc>
               <a:buNone/>
             </a:pPr>
@@ -13337,7 +13039,7 @@
           <a:p>
             <a:pPr marL="0" indent="0" algn="ctr">
               <a:lnSpc>
-                <a:spcPct val="10000"/>
+                <a:spcPct val="10%"/>
               </a:lnSpc>
               <a:buNone/>
             </a:pPr>
@@ -13356,7 +13058,7 @@
           <a:p>
             <a:pPr marL="0" indent="0" algn="ctr">
               <a:lnSpc>
-                <a:spcPct val="80000"/>
+                <a:spcPct val="80%"/>
               </a:lnSpc>
               <a:buNone/>
             </a:pPr>
@@ -13374,7 +13076,7 @@
           <a:p>
             <a:pPr marL="0" indent="0" algn="ctr">
               <a:lnSpc>
-                <a:spcPct val="80000"/>
+                <a:spcPct val="80%"/>
               </a:lnSpc>
               <a:buNone/>
             </a:pPr>
@@ -13393,7 +13095,7 @@
           <a:p>
             <a:pPr marL="0" indent="0" algn="ctr">
               <a:lnSpc>
-                <a:spcPct val="40000"/>
+                <a:spcPct val="40%"/>
               </a:lnSpc>
               <a:buNone/>
             </a:pPr>
@@ -13402,7 +13104,7 @@
           <a:p>
             <a:pPr marL="0" indent="0" algn="ctr">
               <a:lnSpc>
-                <a:spcPct val="80000"/>
+                <a:spcPct val="80%"/>
               </a:lnSpc>
               <a:buNone/>
             </a:pPr>
@@ -13414,7 +13116,7 @@
           <a:p>
             <a:pPr marL="0" indent="0" algn="ctr">
               <a:lnSpc>
-                <a:spcPct val="80000"/>
+                <a:spcPct val="80%"/>
               </a:lnSpc>
               <a:buNone/>
             </a:pPr>
@@ -13427,7 +13129,7 @@
           <a:p>
             <a:pPr marL="0" indent="0" algn="ctr">
               <a:lnSpc>
-                <a:spcPct val="80000"/>
+                <a:spcPct val="80%"/>
               </a:lnSpc>
               <a:buNone/>
             </a:pPr>
@@ -13444,7 +13146,7 @@
           <a:p>
             <a:pPr marL="0" indent="0" algn="ctr">
               <a:lnSpc>
-                <a:spcPct val="80000"/>
+                <a:spcPct val="80%"/>
               </a:lnSpc>
               <a:buNone/>
             </a:pPr>
@@ -13500,7 +13202,7 @@
     <mc:Choice Requires="p14">
       <p:transition spd="slow" p14:dur="2000"/>
     </mc:Choice>
-    <mc:Fallback xmlns="">
+    <mc:Fallback xmlns="" xmlns:p="http://schemas.openxmlformats.org/presentationml/2006/main" xmlns:r="http://schemas.openxmlformats.org/officeDocument/2006/relationships" xmlns:a="http://schemas.openxmlformats.org/drawingml/2006/main">
       <p:transition spd="slow"/>
     </mc:Fallback>
   </mc:AlternateContent>
@@ -13515,7 +13217,7 @@
 </file>
 
 <file path=ppt/slides/slide5.xml><?xml version="1.0" encoding="utf-8"?>
-<p:sld xmlns:a="http://schemas.openxmlformats.org/drawingml/2006/main" xmlns:r="http://schemas.openxmlformats.org/officeDocument/2006/relationships" xmlns:p="http://schemas.openxmlformats.org/presentationml/2006/main">
+<p:sld xmlns:a="http://purl.oclc.org/ooxml/drawingml/main" xmlns:r="http://purl.oclc.org/ooxml/officeDocument/relationships" xmlns:p="http://purl.oclc.org/ooxml/presentationml/main">
   <p:cSld>
     <p:spTree>
       <p:nvGrpSpPr>
@@ -13572,7 +13274,7 @@
         </p:spPr>
         <p:txBody>
           <a:bodyPr>
-            <a:normAutofit fontScale="92500" lnSpcReduction="10000"/>
+            <a:normAutofit fontScale="92.5%" lnSpcReduction="10%"/>
           </a:bodyPr>
           <a:lstStyle/>
           <a:p>
@@ -13671,7 +13373,7 @@
 </file>
 
 <file path=ppt/slides/slide6.xml><?xml version="1.0" encoding="utf-8"?>
-<p:sld xmlns:a="http://schemas.openxmlformats.org/drawingml/2006/main" xmlns:r="http://schemas.openxmlformats.org/officeDocument/2006/relationships" xmlns:p="http://schemas.openxmlformats.org/presentationml/2006/main">
+<p:sld xmlns:a="http://purl.oclc.org/ooxml/drawingml/main" xmlns:r="http://purl.oclc.org/ooxml/officeDocument/relationships" xmlns:p="http://purl.oclc.org/ooxml/presentationml/main">
   <p:cSld>
     <p:spTree>
       <p:nvGrpSpPr>
@@ -13735,7 +13437,7 @@
         </p:spPr>
         <p:txBody>
           <a:bodyPr>
-            <a:normAutofit fontScale="92500" lnSpcReduction="10000"/>
+            <a:normAutofit fontScale="92.5%" lnSpcReduction="10%"/>
           </a:bodyPr>
           <a:lstStyle/>
           <a:p>
@@ -13845,7 +13547,7 @@
 </file>
 
 <file path=ppt/slides/slide7.xml><?xml version="1.0" encoding="utf-8"?>
-<p:sld xmlns:a="http://schemas.openxmlformats.org/drawingml/2006/main" xmlns:r="http://schemas.openxmlformats.org/officeDocument/2006/relationships" xmlns:p="http://schemas.openxmlformats.org/presentationml/2006/main">
+<p:sld xmlns:a="http://purl.oclc.org/ooxml/drawingml/main" xmlns:r="http://purl.oclc.org/ooxml/officeDocument/relationships" xmlns:p="http://purl.oclc.org/ooxml/presentationml/main">
   <p:cSld>
     <p:spTree>
       <p:nvGrpSpPr>
@@ -13921,7 +13623,7 @@
         </p:spPr>
         <p:txBody>
           <a:bodyPr>
-            <a:normAutofit lnSpcReduction="10000"/>
+            <a:normAutofit lnSpcReduction="10%"/>
           </a:bodyPr>
           <a:lstStyle/>
           <a:p>
@@ -14137,12 +13839,12 @@
                                         </p:attrNameLst>
                                       </p:cBhvr>
                                       <p:tavLst>
-                                        <p:tav tm="0">
+                                        <p:tav tm="0%">
                                           <p:val>
                                             <p:strVal val="#ppt_x"/>
                                           </p:val>
                                         </p:tav>
-                                        <p:tav tm="100000">
+                                        <p:tav tm="100%">
                                           <p:val>
                                             <p:strVal val="#ppt_x"/>
                                           </p:val>
@@ -14160,12 +13862,12 @@
                                         </p:attrNameLst>
                                       </p:cBhvr>
                                       <p:tavLst>
-                                        <p:tav tm="0">
+                                        <p:tav tm="0%">
                                           <p:val>
                                             <p:strVal val="0-#ppt_h/2"/>
                                           </p:val>
                                         </p:tav>
-                                        <p:tav tm="100000">
+                                        <p:tav tm="100%">
                                           <p:val>
                                             <p:strVal val="#ppt_y"/>
                                           </p:val>
@@ -14210,7 +13912,7 @@
 </file>
 
 <file path=ppt/slides/slide8.xml><?xml version="1.0" encoding="utf-8"?>
-<p:sld xmlns:a="http://schemas.openxmlformats.org/drawingml/2006/main" xmlns:r="http://schemas.openxmlformats.org/officeDocument/2006/relationships" xmlns:p="http://schemas.openxmlformats.org/presentationml/2006/main">
+<p:sld xmlns:a="http://purl.oclc.org/ooxml/drawingml/main" xmlns:r="http://purl.oclc.org/ooxml/officeDocument/relationships" xmlns:p="http://purl.oclc.org/ooxml/presentationml/main">
   <p:cSld>
     <p:spTree>
       <p:nvGrpSpPr>
@@ -14522,12 +14224,12 @@
                                         </p:attrNameLst>
                                       </p:cBhvr>
                                       <p:tavLst>
-                                        <p:tav tm="0">
+                                        <p:tav tm="0%">
                                           <p:val>
                                             <p:strVal val="#ppt_x"/>
                                           </p:val>
                                         </p:tav>
-                                        <p:tav tm="100000">
+                                        <p:tav tm="100%">
                                           <p:val>
                                             <p:strVal val="#ppt_x"/>
                                           </p:val>
@@ -14545,12 +14247,12 @@
                                         </p:attrNameLst>
                                       </p:cBhvr>
                                       <p:tavLst>
-                                        <p:tav tm="0">
+                                        <p:tav tm="0%">
                                           <p:val>
                                             <p:strVal val="0-#ppt_h/2"/>
                                           </p:val>
                                         </p:tav>
-                                        <p:tav tm="100000">
+                                        <p:tav tm="100%">
                                           <p:val>
                                             <p:strVal val="#ppt_y"/>
                                           </p:val>
@@ -14595,7 +14297,7 @@
 </file>
 
 <file path=ppt/slides/slide9.xml><?xml version="1.0" encoding="utf-8"?>
-<p:sld xmlns:a="http://schemas.openxmlformats.org/drawingml/2006/main" xmlns:r="http://schemas.openxmlformats.org/officeDocument/2006/relationships" xmlns:p="http://schemas.openxmlformats.org/presentationml/2006/main">
+<p:sld xmlns:a="http://purl.oclc.org/ooxml/drawingml/main" xmlns:r="http://purl.oclc.org/ooxml/officeDocument/relationships" xmlns:p="http://purl.oclc.org/ooxml/presentationml/main">
   <p:cSld>
     <p:spTree>
       <p:nvGrpSpPr>
@@ -14658,7 +14360,7 @@
         </p:spPr>
         <p:txBody>
           <a:bodyPr>
-            <a:normAutofit fontScale="92500"/>
+            <a:normAutofit fontScale="92.5%"/>
           </a:bodyPr>
           <a:lstStyle/>
           <a:p>
@@ -14780,7 +14482,7 @@
 </file>
 
 <file path=ppt/theme/theme1.xml><?xml version="1.0" encoding="utf-8"?>
-<a:theme xmlns:a="http://schemas.openxmlformats.org/drawingml/2006/main" name="Office Theme">
+<a:theme xmlns:a="http://purl.oclc.org/ooxml/drawingml/main" name="Office Theme">
   <a:themeElements>
     <a:clrScheme name="Office">
       <a:dk1>
@@ -14899,22 +14601,22 @@
         </a:solidFill>
         <a:gradFill rotWithShape="1">
           <a:gsLst>
-            <a:gs pos="0">
+            <a:gs pos="0%">
               <a:schemeClr val="phClr">
-                <a:tint val="50000"/>
-                <a:satMod val="300000"/>
+                <a:tint val="50%"/>
+                <a:satMod val="300%"/>
               </a:schemeClr>
             </a:gs>
-            <a:gs pos="35000">
+            <a:gs pos="35%">
               <a:schemeClr val="phClr">
-                <a:tint val="37000"/>
-                <a:satMod val="300000"/>
+                <a:tint val="37%"/>
+                <a:satMod val="300%"/>
               </a:schemeClr>
             </a:gs>
-            <a:gs pos="100000">
+            <a:gs pos="100%">
               <a:schemeClr val="phClr">
-                <a:tint val="15000"/>
-                <a:satMod val="350000"/>
+                <a:tint val="15%"/>
+                <a:satMod val="350%"/>
               </a:schemeClr>
             </a:gs>
           </a:gsLst>
@@ -14922,22 +14624,22 @@
         </a:gradFill>
         <a:gradFill rotWithShape="1">
           <a:gsLst>
-            <a:gs pos="0">
+            <a:gs pos="0%">
               <a:schemeClr val="phClr">
-                <a:shade val="51000"/>
-                <a:satMod val="130000"/>
+                <a:shade val="51%"/>
+                <a:satMod val="130%"/>
               </a:schemeClr>
             </a:gs>
-            <a:gs pos="80000">
+            <a:gs pos="80%">
               <a:schemeClr val="phClr">
-                <a:shade val="93000"/>
-                <a:satMod val="130000"/>
+                <a:shade val="93%"/>
+                <a:satMod val="130%"/>
               </a:schemeClr>
             </a:gs>
-            <a:gs pos="100000">
+            <a:gs pos="100%">
               <a:schemeClr val="phClr">
-                <a:shade val="94000"/>
-                <a:satMod val="135000"/>
+                <a:shade val="94%"/>
+                <a:satMod val="135%"/>
               </a:schemeClr>
             </a:gs>
           </a:gsLst>
@@ -14948,8 +14650,8 @@
         <a:ln w="9525" cap="flat" cmpd="sng" algn="ctr">
           <a:solidFill>
             <a:schemeClr val="phClr">
-              <a:shade val="95000"/>
-              <a:satMod val="105000"/>
+              <a:shade val="95%"/>
+              <a:satMod val="105%"/>
             </a:schemeClr>
           </a:solidFill>
           <a:prstDash val="solid"/>
@@ -14972,7 +14674,7 @@
           <a:effectLst>
             <a:outerShdw blurRad="40000" dist="20000" dir="5400000" rotWithShape="0">
               <a:srgbClr val="000000">
-                <a:alpha val="38000"/>
+                <a:alpha val="38%"/>
               </a:srgbClr>
             </a:outerShdw>
           </a:effectLst>
@@ -14981,7 +14683,7 @@
           <a:effectLst>
             <a:outerShdw blurRad="40000" dist="23000" dir="5400000" rotWithShape="0">
               <a:srgbClr val="000000">
-                <a:alpha val="35000"/>
+                <a:alpha val="35%"/>
               </a:srgbClr>
             </a:outerShdw>
           </a:effectLst>
@@ -14990,7 +14692,7 @@
           <a:effectLst>
             <a:outerShdw blurRad="40000" dist="23000" dir="5400000" rotWithShape="0">
               <a:srgbClr val="000000">
-                <a:alpha val="35000"/>
+                <a:alpha val="35%"/>
               </a:srgbClr>
             </a:outerShdw>
           </a:effectLst>
@@ -15013,47 +14715,47 @@
         </a:solidFill>
         <a:gradFill rotWithShape="1">
           <a:gsLst>
-            <a:gs pos="0">
+            <a:gs pos="0%">
               <a:schemeClr val="phClr">
-                <a:tint val="40000"/>
-                <a:satMod val="350000"/>
+                <a:tint val="40%"/>
+                <a:satMod val="350%"/>
               </a:schemeClr>
             </a:gs>
-            <a:gs pos="40000">
+            <a:gs pos="40%">
               <a:schemeClr val="phClr">
-                <a:tint val="45000"/>
-                <a:shade val="99000"/>
-                <a:satMod val="350000"/>
+                <a:tint val="45%"/>
+                <a:shade val="99%"/>
+                <a:satMod val="350%"/>
               </a:schemeClr>
             </a:gs>
-            <a:gs pos="100000">
+            <a:gs pos="100%">
               <a:schemeClr val="phClr">
-                <a:shade val="20000"/>
-                <a:satMod val="255000"/>
+                <a:shade val="20%"/>
+                <a:satMod val="255%"/>
               </a:schemeClr>
             </a:gs>
           </a:gsLst>
           <a:path path="circle">
-            <a:fillToRect l="50000" t="-80000" r="50000" b="180000"/>
+            <a:fillToRect l="50%" t="-80%" r="50%" b="180%"/>
           </a:path>
         </a:gradFill>
         <a:gradFill rotWithShape="1">
           <a:gsLst>
-            <a:gs pos="0">
+            <a:gs pos="0%">
               <a:schemeClr val="phClr">
-                <a:tint val="80000"/>
-                <a:satMod val="300000"/>
+                <a:tint val="80%"/>
+                <a:satMod val="300%"/>
               </a:schemeClr>
             </a:gs>
-            <a:gs pos="100000">
+            <a:gs pos="100%">
               <a:schemeClr val="phClr">
-                <a:shade val="30000"/>
-                <a:satMod val="200000"/>
+                <a:shade val="30%"/>
+                <a:satMod val="200%"/>
               </a:schemeClr>
             </a:gs>
           </a:gsLst>
           <a:path path="circle">
-            <a:fillToRect l="50000" t="50000" r="50000" b="50000"/>
+            <a:fillToRect l="50%" t="50%" r="50%" b="50%"/>
           </a:path>
         </a:gradFill>
       </a:bgFillStyleLst>
@@ -15065,7 +14767,7 @@
 </file>
 
 <file path=ppt/theme/theme2.xml><?xml version="1.0" encoding="utf-8"?>
-<a:theme xmlns:a="http://schemas.openxmlformats.org/drawingml/2006/main" name="Office Theme">
+<a:theme xmlns:a="http://purl.oclc.org/ooxml/drawingml/main" name="Office Theme">
   <a:themeElements>
     <a:clrScheme name="Office">
       <a:dk1>
@@ -15184,22 +14886,22 @@
         </a:solidFill>
         <a:gradFill rotWithShape="1">
           <a:gsLst>
-            <a:gs pos="0">
+            <a:gs pos="0%">
               <a:schemeClr val="phClr">
-                <a:tint val="50000"/>
-                <a:satMod val="300000"/>
+                <a:tint val="50%"/>
+                <a:satMod val="300%"/>
               </a:schemeClr>
             </a:gs>
-            <a:gs pos="35000">
+            <a:gs pos="35%">
               <a:schemeClr val="phClr">
-                <a:tint val="37000"/>
-                <a:satMod val="300000"/>
+                <a:tint val="37%"/>
+                <a:satMod val="300%"/>
               </a:schemeClr>
             </a:gs>
-            <a:gs pos="100000">
+            <a:gs pos="100%">
               <a:schemeClr val="phClr">
-                <a:tint val="15000"/>
-                <a:satMod val="350000"/>
+                <a:tint val="15%"/>
+                <a:satMod val="350%"/>
               </a:schemeClr>
             </a:gs>
           </a:gsLst>
@@ -15207,22 +14909,22 @@
         </a:gradFill>
         <a:gradFill rotWithShape="1">
           <a:gsLst>
-            <a:gs pos="0">
+            <a:gs pos="0%">
               <a:schemeClr val="phClr">
-                <a:shade val="51000"/>
-                <a:satMod val="130000"/>
+                <a:shade val="51%"/>
+                <a:satMod val="130%"/>
               </a:schemeClr>
             </a:gs>
-            <a:gs pos="80000">
+            <a:gs pos="80%">
               <a:schemeClr val="phClr">
-                <a:shade val="93000"/>
-                <a:satMod val="130000"/>
+                <a:shade val="93%"/>
+                <a:satMod val="130%"/>
               </a:schemeClr>
             </a:gs>
-            <a:gs pos="100000">
+            <a:gs pos="100%">
               <a:schemeClr val="phClr">
-                <a:shade val="94000"/>
-                <a:satMod val="135000"/>
+                <a:shade val="94%"/>
+                <a:satMod val="135%"/>
               </a:schemeClr>
             </a:gs>
           </a:gsLst>
@@ -15233,8 +14935,8 @@
         <a:ln w="9525" cap="flat" cmpd="sng" algn="ctr">
           <a:solidFill>
             <a:schemeClr val="phClr">
-              <a:shade val="95000"/>
-              <a:satMod val="105000"/>
+              <a:shade val="95%"/>
+              <a:satMod val="105%"/>
             </a:schemeClr>
           </a:solidFill>
           <a:prstDash val="solid"/>
@@ -15257,7 +14959,7 @@
           <a:effectLst>
             <a:outerShdw blurRad="40000" dist="20000" dir="5400000" rotWithShape="0">
               <a:srgbClr val="000000">
-                <a:alpha val="38000"/>
+                <a:alpha val="38%"/>
               </a:srgbClr>
             </a:outerShdw>
           </a:effectLst>
@@ -15266,7 +14968,7 @@
           <a:effectLst>
             <a:outerShdw blurRad="40000" dist="23000" dir="5400000" rotWithShape="0">
               <a:srgbClr val="000000">
-                <a:alpha val="35000"/>
+                <a:alpha val="35%"/>
               </a:srgbClr>
             </a:outerShdw>
           </a:effectLst>
@@ -15275,7 +14977,7 @@
           <a:effectLst>
             <a:outerShdw blurRad="40000" dist="23000" dir="5400000" rotWithShape="0">
               <a:srgbClr val="000000">
-                <a:alpha val="35000"/>
+                <a:alpha val="35%"/>
               </a:srgbClr>
             </a:outerShdw>
           </a:effectLst>
@@ -15298,47 +15000,47 @@
         </a:solidFill>
         <a:gradFill rotWithShape="1">
           <a:gsLst>
-            <a:gs pos="0">
+            <a:gs pos="0%">
               <a:schemeClr val="phClr">
-                <a:tint val="40000"/>
-                <a:satMod val="350000"/>
+                <a:tint val="40%"/>
+                <a:satMod val="350%"/>
               </a:schemeClr>
             </a:gs>
-            <a:gs pos="40000">
+            <a:gs pos="40%">
               <a:schemeClr val="phClr">
-                <a:tint val="45000"/>
-                <a:shade val="99000"/>
-                <a:satMod val="350000"/>
+                <a:tint val="45%"/>
+                <a:shade val="99%"/>
+                <a:satMod val="350%"/>
               </a:schemeClr>
             </a:gs>
-            <a:gs pos="100000">
+            <a:gs pos="100%">
               <a:schemeClr val="phClr">
-                <a:shade val="20000"/>
-                <a:satMod val="255000"/>
+                <a:shade val="20%"/>
+                <a:satMod val="255%"/>
               </a:schemeClr>
             </a:gs>
           </a:gsLst>
           <a:path path="circle">
-            <a:fillToRect l="50000" t="-80000" r="50000" b="180000"/>
+            <a:fillToRect l="50%" t="-80%" r="50%" b="180%"/>
           </a:path>
         </a:gradFill>
         <a:gradFill rotWithShape="1">
           <a:gsLst>
-            <a:gs pos="0">
+            <a:gs pos="0%">
               <a:schemeClr val="phClr">
-                <a:tint val="80000"/>
-                <a:satMod val="300000"/>
+                <a:tint val="80%"/>
+                <a:satMod val="300%"/>
               </a:schemeClr>
             </a:gs>
-            <a:gs pos="100000">
+            <a:gs pos="100%">
               <a:schemeClr val="phClr">
-                <a:shade val="30000"/>
-                <a:satMod val="200000"/>
+                <a:shade val="30%"/>
+                <a:satMod val="200%"/>
               </a:schemeClr>
             </a:gs>
           </a:gsLst>
           <a:path path="circle">
-            <a:fillToRect l="50000" t="50000" r="50000" b="50000"/>
+            <a:fillToRect l="50%" t="50%" r="50%" b="50%"/>
           </a:path>
         </a:gradFill>
       </a:bgFillStyleLst>

</xml_diff>